<commit_message>
anhvt tai lieu full
</commit_message>
<xml_diff>
--- a/SaleManager/Tài Liệu/ThuyetTrinh.pptx
+++ b/SaleManager/Tài Liệu/ThuyetTrinh.pptx
@@ -5,7 +5,7 @@
     <p:sldMasterId id="2147483742" r:id="rId1"/>
   </p:sldMasterIdLst>
   <p:notesMasterIdLst>
-    <p:notesMasterId r:id="rId15"/>
+    <p:notesMasterId r:id="rId26"/>
   </p:notesMasterIdLst>
   <p:sldIdLst>
     <p:sldId id="274" r:id="rId2"/>
@@ -20,7 +20,18 @@
     <p:sldId id="266" r:id="rId11"/>
     <p:sldId id="267" r:id="rId12"/>
     <p:sldId id="271" r:id="rId13"/>
-    <p:sldId id="275" r:id="rId14"/>
+    <p:sldId id="276" r:id="rId14"/>
+    <p:sldId id="277" r:id="rId15"/>
+    <p:sldId id="278" r:id="rId16"/>
+    <p:sldId id="279" r:id="rId17"/>
+    <p:sldId id="281" r:id="rId18"/>
+    <p:sldId id="280" r:id="rId19"/>
+    <p:sldId id="275" r:id="rId20"/>
+    <p:sldId id="283" r:id="rId21"/>
+    <p:sldId id="284" r:id="rId22"/>
+    <p:sldId id="285" r:id="rId23"/>
+    <p:sldId id="286" r:id="rId24"/>
+    <p:sldId id="287" r:id="rId25"/>
   </p:sldIdLst>
   <p:sldSz cx="12192000" cy="6858000"/>
   <p:notesSz cx="6858000" cy="9144000"/>
@@ -4946,12 +4957,426 @@
             <p:ph type="title"/>
           </p:nvPr>
         </p:nvSpPr>
+        <p:spPr>
+          <a:xfrm>
+            <a:off x="626300" y="707826"/>
+            <a:ext cx="10972800" cy="990600"/>
+          </a:xfrm>
+        </p:spPr>
+        <p:txBody>
+          <a:bodyPr>
+            <a:normAutofit fontScale="90000"/>
+          </a:bodyPr>
+          <a:lstStyle/>
+          <a:p>
+            <a:r>
+              <a:rPr lang="en-US" dirty="0"/>
+              <a:t>6. </a:t>
+            </a:r>
+            <a:r>
+              <a:rPr lang="en-US" dirty="0" err="1"/>
+              <a:t>Quản</a:t>
+            </a:r>
+            <a:r>
+              <a:rPr lang="en-US" dirty="0"/>
+              <a:t> </a:t>
+            </a:r>
+            <a:r>
+              <a:rPr lang="en-US" dirty="0" err="1"/>
+              <a:t>lý</a:t>
+            </a:r>
+            <a:r>
+              <a:rPr lang="en-US" dirty="0"/>
+              <a:t> </a:t>
+            </a:r>
+            <a:r>
+              <a:rPr lang="en-US" dirty="0" err="1"/>
+              <a:t>hóa</a:t>
+            </a:r>
+            <a:r>
+              <a:rPr lang="en-US" dirty="0"/>
+              <a:t> </a:t>
+            </a:r>
+            <a:r>
+              <a:rPr lang="en-US" dirty="0" err="1"/>
+              <a:t>đơn</a:t>
+            </a:r>
+            <a:r>
+              <a:rPr lang="en-US" dirty="0"/>
+              <a:t> </a:t>
+            </a:r>
+            <a:r>
+              <a:rPr lang="en-US" dirty="0" err="1"/>
+              <a:t>bán</a:t>
+            </a:r>
+            <a:r>
+              <a:rPr lang="en-US" dirty="0"/>
+              <a:t> </a:t>
+            </a:r>
+            <a:r>
+              <a:rPr lang="en-US" dirty="0" err="1"/>
+              <a:t>hàng</a:t>
+            </a:r>
+            <a:br>
+              <a:rPr lang="en-US" dirty="0"/>
+            </a:br>
+            <a:endParaRPr lang="en-US" sz="4000" dirty="0"/>
+          </a:p>
+        </p:txBody>
+      </p:sp>
+      <p:sp>
+        <p:nvSpPr>
+          <p:cNvPr id="3" name="Content Placeholder 2"/>
+          <p:cNvSpPr>
+            <a:spLocks noGrp="1"/>
+          </p:cNvSpPr>
+          <p:nvPr>
+            <p:ph sz="quarter" idx="1"/>
+          </p:nvPr>
+        </p:nvSpPr>
+        <p:spPr>
+          <a:xfrm>
+            <a:off x="677334" y="1423989"/>
+            <a:ext cx="8596668" cy="3880773"/>
+          </a:xfrm>
+        </p:spPr>
+        <p:txBody>
+          <a:bodyPr/>
+          <a:lstStyle/>
+          <a:p>
+            <a:r>
+              <a:rPr lang="en-US" dirty="0"/>
+              <a:t>6.1 Thêm </a:t>
+            </a:r>
+            <a:r>
+              <a:rPr lang="en-US" dirty="0" err="1"/>
+              <a:t>hóa</a:t>
+            </a:r>
+            <a:r>
+              <a:rPr lang="en-US" dirty="0"/>
+              <a:t> </a:t>
+            </a:r>
+            <a:r>
+              <a:rPr lang="en-US" dirty="0" err="1"/>
+              <a:t>đơn</a:t>
+            </a:r>
+            <a:r>
+              <a:rPr lang="en-US" dirty="0"/>
+              <a:t> </a:t>
+            </a:r>
+            <a:r>
+              <a:rPr lang="en-US" dirty="0" err="1"/>
+              <a:t>bán</a:t>
+            </a:r>
+            <a:r>
+              <a:rPr lang="en-US" dirty="0"/>
+              <a:t> </a:t>
+            </a:r>
+            <a:r>
+              <a:rPr lang="en-US" dirty="0" err="1"/>
+              <a:t>hàng</a:t>
+            </a:r>
+            <a:endParaRPr lang="en-US" dirty="0"/>
+          </a:p>
+        </p:txBody>
+      </p:sp>
+      <p:pic>
+        <p:nvPicPr>
+          <p:cNvPr id="7" name="Picture 6"/>
+          <p:cNvPicPr>
+            <a:picLocks noChangeAspect="1"/>
+          </p:cNvPicPr>
+          <p:nvPr/>
+        </p:nvPicPr>
+        <p:blipFill>
+          <a:blip r:embed="rId2"/>
+          <a:stretch>
+            <a:fillRect/>
+          </a:stretch>
+        </p:blipFill>
+        <p:spPr>
+          <a:xfrm>
+            <a:off x="677334" y="2063934"/>
+            <a:ext cx="8138357" cy="4140568"/>
+          </a:xfrm>
+          <a:prstGeom prst="rect">
+            <a:avLst/>
+          </a:prstGeom>
+        </p:spPr>
+      </p:pic>
+      <p:pic>
+        <p:nvPicPr>
+          <p:cNvPr id="8" name="Picture 7"/>
+          <p:cNvPicPr>
+            <a:picLocks noChangeAspect="1"/>
+          </p:cNvPicPr>
+          <p:nvPr/>
+        </p:nvPicPr>
+        <p:blipFill>
+          <a:blip r:embed="rId3"/>
+          <a:stretch>
+            <a:fillRect/>
+          </a:stretch>
+        </p:blipFill>
+        <p:spPr>
+          <a:xfrm>
+            <a:off x="9782175" y="5505843"/>
+            <a:ext cx="2409825" cy="1323975"/>
+          </a:xfrm>
+          <a:prstGeom prst="rect">
+            <a:avLst/>
+          </a:prstGeom>
+        </p:spPr>
+      </p:pic>
+    </p:spTree>
+    <p:extLst>
+      <p:ext uri="{BB962C8B-B14F-4D97-AF65-F5344CB8AC3E}">
+        <p14:creationId xmlns:p14="http://schemas.microsoft.com/office/powerpoint/2010/main" val="3507871411"/>
+      </p:ext>
+    </p:extLst>
+  </p:cSld>
+  <p:clrMapOvr>
+    <a:masterClrMapping/>
+  </p:clrMapOvr>
+</p:sld>
+</file>
+
+<file path=ppt/slides/slide14.xml><?xml version="1.0" encoding="utf-8"?>
+<p:sld xmlns:a="http://schemas.openxmlformats.org/drawingml/2006/main" xmlns:r="http://schemas.openxmlformats.org/officeDocument/2006/relationships" xmlns:p="http://schemas.openxmlformats.org/presentationml/2006/main">
+  <p:cSld>
+    <p:spTree>
+      <p:nvGrpSpPr>
+        <p:cNvPr id="1" name=""/>
+        <p:cNvGrpSpPr/>
+        <p:nvPr/>
+      </p:nvGrpSpPr>
+      <p:grpSpPr>
+        <a:xfrm>
+          <a:off x="0" y="0"/>
+          <a:ext cx="0" cy="0"/>
+          <a:chOff x="0" y="0"/>
+          <a:chExt cx="0" cy="0"/>
+        </a:xfrm>
+      </p:grpSpPr>
+      <p:sp>
+        <p:nvSpPr>
+          <p:cNvPr id="2" name="Title 1"/>
+          <p:cNvSpPr>
+            <a:spLocks noGrp="1"/>
+          </p:cNvSpPr>
+          <p:nvPr>
+            <p:ph type="title"/>
+          </p:nvPr>
+        </p:nvSpPr>
         <p:spPr/>
         <p:txBody>
+          <a:bodyPr>
+            <a:normAutofit/>
+          </a:bodyPr>
+          <a:lstStyle/>
+          <a:p>
+            <a:r>
+              <a:rPr lang="en-US" sz="3600" dirty="0"/>
+              <a:t>6. Quản lý hóa </a:t>
+            </a:r>
+            <a:r>
+              <a:rPr lang="en-US" sz="3600" dirty="0" err="1"/>
+              <a:t>đơn</a:t>
+            </a:r>
+            <a:r>
+              <a:rPr lang="en-US" sz="3600" dirty="0"/>
+              <a:t> </a:t>
+            </a:r>
+            <a:r>
+              <a:rPr lang="en-US" sz="3600" dirty="0" err="1"/>
+              <a:t>bán</a:t>
+            </a:r>
+            <a:r>
+              <a:rPr lang="en-US" sz="3600" dirty="0"/>
+              <a:t> hàng</a:t>
+            </a:r>
+          </a:p>
+        </p:txBody>
+      </p:sp>
+      <p:sp>
+        <p:nvSpPr>
+          <p:cNvPr id="3" name="Content Placeholder 2"/>
+          <p:cNvSpPr>
+            <a:spLocks noGrp="1"/>
+          </p:cNvSpPr>
+          <p:nvPr>
+            <p:ph sz="quarter" idx="1"/>
+          </p:nvPr>
+        </p:nvSpPr>
+        <p:spPr>
+          <a:xfrm>
+            <a:off x="677334" y="1360489"/>
+            <a:ext cx="8596668" cy="3880773"/>
+          </a:xfrm>
+        </p:spPr>
+        <p:txBody>
           <a:bodyPr/>
           <a:lstStyle/>
           <a:p>
-            <a:endParaRPr lang="en-US"/>
+            <a:r>
+              <a:rPr lang="en-US" dirty="0"/>
+              <a:t>6.2 Danh sách </a:t>
+            </a:r>
+            <a:r>
+              <a:rPr lang="en-US" dirty="0" err="1"/>
+              <a:t>hóa</a:t>
+            </a:r>
+            <a:r>
+              <a:rPr lang="en-US" dirty="0"/>
+              <a:t> </a:t>
+            </a:r>
+            <a:r>
+              <a:rPr lang="en-US" dirty="0" err="1"/>
+              <a:t>đơn</a:t>
+            </a:r>
+            <a:r>
+              <a:rPr lang="en-US" dirty="0"/>
+              <a:t> </a:t>
+            </a:r>
+            <a:r>
+              <a:rPr lang="en-US" dirty="0" err="1"/>
+              <a:t>mua</a:t>
+            </a:r>
+            <a:r>
+              <a:rPr lang="en-US" dirty="0"/>
+              <a:t> </a:t>
+            </a:r>
+            <a:r>
+              <a:rPr lang="en-US" dirty="0" err="1"/>
+              <a:t>hàng</a:t>
+            </a:r>
+            <a:r>
+              <a:rPr lang="en-US" dirty="0"/>
+              <a:t> :</a:t>
+            </a:r>
+          </a:p>
+        </p:txBody>
+      </p:sp>
+      <p:pic>
+        <p:nvPicPr>
+          <p:cNvPr id="5" name="Picture 4"/>
+          <p:cNvPicPr>
+            <a:picLocks noChangeAspect="1"/>
+          </p:cNvPicPr>
+          <p:nvPr/>
+        </p:nvPicPr>
+        <p:blipFill>
+          <a:blip r:embed="rId2"/>
+          <a:stretch>
+            <a:fillRect/>
+          </a:stretch>
+        </p:blipFill>
+        <p:spPr>
+          <a:xfrm>
+            <a:off x="576262" y="2176050"/>
+            <a:ext cx="11039475" cy="3248025"/>
+          </a:xfrm>
+          <a:prstGeom prst="rect">
+            <a:avLst/>
+          </a:prstGeom>
+        </p:spPr>
+      </p:pic>
+    </p:spTree>
+    <p:extLst>
+      <p:ext uri="{BB962C8B-B14F-4D97-AF65-F5344CB8AC3E}">
+        <p14:creationId xmlns:p14="http://schemas.microsoft.com/office/powerpoint/2010/main" val="1768487727"/>
+      </p:ext>
+    </p:extLst>
+  </p:cSld>
+  <p:clrMapOvr>
+    <a:masterClrMapping/>
+  </p:clrMapOvr>
+</p:sld>
+</file>
+
+<file path=ppt/slides/slide15.xml><?xml version="1.0" encoding="utf-8"?>
+<p:sld xmlns:a="http://schemas.openxmlformats.org/drawingml/2006/main" xmlns:r="http://schemas.openxmlformats.org/officeDocument/2006/relationships" xmlns:p="http://schemas.openxmlformats.org/presentationml/2006/main">
+  <p:cSld>
+    <p:spTree>
+      <p:nvGrpSpPr>
+        <p:cNvPr id="1" name=""/>
+        <p:cNvGrpSpPr/>
+        <p:nvPr/>
+      </p:nvGrpSpPr>
+      <p:grpSpPr>
+        <a:xfrm>
+          <a:off x="0" y="0"/>
+          <a:ext cx="0" cy="0"/>
+          <a:chOff x="0" y="0"/>
+          <a:chExt cx="0" cy="0"/>
+        </a:xfrm>
+      </p:grpSpPr>
+      <p:sp>
+        <p:nvSpPr>
+          <p:cNvPr id="2" name="Title 1"/>
+          <p:cNvSpPr>
+            <a:spLocks noGrp="1"/>
+          </p:cNvSpPr>
+          <p:nvPr>
+            <p:ph type="title"/>
+          </p:nvPr>
+        </p:nvSpPr>
+        <p:spPr/>
+        <p:txBody>
+          <a:bodyPr>
+            <a:normAutofit/>
+          </a:bodyPr>
+          <a:lstStyle/>
+          <a:p>
+            <a:r>
+              <a:rPr lang="en-US" sz="3600" dirty="0"/>
+              <a:t>7. </a:t>
+            </a:r>
+            <a:r>
+              <a:rPr lang="en-US" sz="3600" dirty="0" err="1"/>
+              <a:t>Các</a:t>
+            </a:r>
+            <a:r>
+              <a:rPr lang="en-US" sz="3600" dirty="0"/>
+              <a:t> </a:t>
+            </a:r>
+            <a:r>
+              <a:rPr lang="en-US" sz="3600" dirty="0" err="1"/>
+              <a:t>giao</a:t>
+            </a:r>
+            <a:r>
+              <a:rPr lang="en-US" sz="3600" dirty="0"/>
+              <a:t> </a:t>
+            </a:r>
+            <a:r>
+              <a:rPr lang="en-US" sz="3600" dirty="0" err="1"/>
+              <a:t>dịch</a:t>
+            </a:r>
+            <a:r>
+              <a:rPr lang="en-US" sz="3600" dirty="0"/>
+              <a:t> </a:t>
+            </a:r>
+            <a:r>
+              <a:rPr lang="en-US" sz="3600" dirty="0" err="1"/>
+              <a:t>trả</a:t>
+            </a:r>
+            <a:r>
+              <a:rPr lang="en-US" sz="3600" dirty="0"/>
+              <a:t> </a:t>
+            </a:r>
+            <a:r>
+              <a:rPr lang="en-US" sz="3600" dirty="0" err="1"/>
+              <a:t>lại</a:t>
+            </a:r>
+            <a:r>
+              <a:rPr lang="en-US" sz="3600" dirty="0"/>
+              <a:t> </a:t>
+            </a:r>
+            <a:r>
+              <a:rPr lang="en-US" sz="3600" dirty="0" err="1"/>
+              <a:t>hàng</a:t>
+            </a:r>
+            <a:endParaRPr lang="en-US" sz="3600" dirty="0"/>
           </a:p>
         </p:txBody>
       </p:sp>
@@ -4965,15 +5390,953 @@
             <p:ph sz="quarter" idx="1"/>
           </p:nvPr>
         </p:nvSpPr>
+        <p:spPr>
+          <a:xfrm>
+            <a:off x="677334" y="1360489"/>
+            <a:ext cx="8596668" cy="3880773"/>
+          </a:xfrm>
+        </p:spPr>
+        <p:txBody>
+          <a:bodyPr/>
+          <a:lstStyle/>
+          <a:p>
+            <a:r>
+              <a:rPr lang="en-US" dirty="0"/>
+              <a:t>7.1 </a:t>
+            </a:r>
+            <a:r>
+              <a:rPr lang="en-US" dirty="0" err="1"/>
+              <a:t>Thêm</a:t>
+            </a:r>
+            <a:r>
+              <a:rPr lang="en-US" dirty="0"/>
+              <a:t> </a:t>
+            </a:r>
+            <a:r>
+              <a:rPr lang="en-US" sz="2800" dirty="0" err="1"/>
+              <a:t>các</a:t>
+            </a:r>
+            <a:r>
+              <a:rPr lang="en-US" sz="2800" dirty="0"/>
+              <a:t> </a:t>
+            </a:r>
+            <a:r>
+              <a:rPr lang="en-US" sz="2800" dirty="0" err="1"/>
+              <a:t>giao</a:t>
+            </a:r>
+            <a:r>
+              <a:rPr lang="en-US" sz="2800" dirty="0"/>
+              <a:t> </a:t>
+            </a:r>
+            <a:r>
+              <a:rPr lang="en-US" sz="2800" dirty="0" err="1"/>
+              <a:t>dịch</a:t>
+            </a:r>
+            <a:r>
+              <a:rPr lang="en-US" sz="2800" dirty="0"/>
+              <a:t> </a:t>
+            </a:r>
+            <a:r>
+              <a:rPr lang="en-US" sz="2800" dirty="0" err="1"/>
+              <a:t>trả</a:t>
+            </a:r>
+            <a:r>
+              <a:rPr lang="en-US" sz="2800" dirty="0"/>
+              <a:t> </a:t>
+            </a:r>
+            <a:r>
+              <a:rPr lang="en-US" sz="2800" dirty="0" err="1"/>
+              <a:t>lại</a:t>
+            </a:r>
+            <a:r>
+              <a:rPr lang="en-US" sz="2800" dirty="0"/>
+              <a:t> </a:t>
+            </a:r>
+            <a:r>
+              <a:rPr lang="en-US" sz="2800" dirty="0" err="1"/>
+              <a:t>hàng</a:t>
+            </a:r>
+            <a:r>
+              <a:rPr lang="en-US" sz="2800" dirty="0"/>
+              <a:t> </a:t>
+            </a:r>
+            <a:r>
+              <a:rPr lang="en-US" dirty="0"/>
+              <a:t>:</a:t>
+            </a:r>
+          </a:p>
+        </p:txBody>
+      </p:sp>
+      <p:pic>
+        <p:nvPicPr>
+          <p:cNvPr id="6" name="Picture 5"/>
+          <p:cNvPicPr>
+            <a:picLocks noChangeAspect="1"/>
+          </p:cNvPicPr>
+          <p:nvPr/>
+        </p:nvPicPr>
+        <p:blipFill>
+          <a:blip r:embed="rId2"/>
+          <a:stretch>
+            <a:fillRect/>
+          </a:stretch>
+        </p:blipFill>
+        <p:spPr>
+          <a:xfrm>
+            <a:off x="623887" y="2078927"/>
+            <a:ext cx="8188809" cy="4069460"/>
+          </a:xfrm>
+          <a:prstGeom prst="rect">
+            <a:avLst/>
+          </a:prstGeom>
+        </p:spPr>
+      </p:pic>
+      <p:pic>
+        <p:nvPicPr>
+          <p:cNvPr id="7" name="Picture 6"/>
+          <p:cNvPicPr>
+            <a:picLocks noChangeAspect="1"/>
+          </p:cNvPicPr>
+          <p:nvPr/>
+        </p:nvPicPr>
+        <p:blipFill>
+          <a:blip r:embed="rId3"/>
+          <a:stretch>
+            <a:fillRect/>
+          </a:stretch>
+        </p:blipFill>
+        <p:spPr>
+          <a:xfrm>
+            <a:off x="10086975" y="5248275"/>
+            <a:ext cx="2105025" cy="1609725"/>
+          </a:xfrm>
+          <a:prstGeom prst="rect">
+            <a:avLst/>
+          </a:prstGeom>
+        </p:spPr>
+      </p:pic>
+    </p:spTree>
+    <p:extLst>
+      <p:ext uri="{BB962C8B-B14F-4D97-AF65-F5344CB8AC3E}">
+        <p14:creationId xmlns:p14="http://schemas.microsoft.com/office/powerpoint/2010/main" val="2855630141"/>
+      </p:ext>
+    </p:extLst>
+  </p:cSld>
+  <p:clrMapOvr>
+    <a:masterClrMapping/>
+  </p:clrMapOvr>
+</p:sld>
+</file>
+
+<file path=ppt/slides/slide16.xml><?xml version="1.0" encoding="utf-8"?>
+<p:sld xmlns:a="http://schemas.openxmlformats.org/drawingml/2006/main" xmlns:r="http://schemas.openxmlformats.org/officeDocument/2006/relationships" xmlns:p="http://schemas.openxmlformats.org/presentationml/2006/main">
+  <p:cSld>
+    <p:spTree>
+      <p:nvGrpSpPr>
+        <p:cNvPr id="1" name=""/>
+        <p:cNvGrpSpPr/>
+        <p:nvPr/>
+      </p:nvGrpSpPr>
+      <p:grpSpPr>
+        <a:xfrm>
+          <a:off x="0" y="0"/>
+          <a:ext cx="0" cy="0"/>
+          <a:chOff x="0" y="0"/>
+          <a:chExt cx="0" cy="0"/>
+        </a:xfrm>
+      </p:grpSpPr>
+      <p:sp>
+        <p:nvSpPr>
+          <p:cNvPr id="2" name="Title 1"/>
+          <p:cNvSpPr>
+            <a:spLocks noGrp="1"/>
+          </p:cNvSpPr>
+          <p:nvPr>
+            <p:ph type="title"/>
+          </p:nvPr>
+        </p:nvSpPr>
         <p:spPr/>
         <p:txBody>
+          <a:bodyPr>
+            <a:normAutofit/>
+          </a:bodyPr>
+          <a:lstStyle/>
+          <a:p>
+            <a:r>
+              <a:rPr lang="en-US" sz="3600" dirty="0"/>
+              <a:t>7. </a:t>
+            </a:r>
+            <a:r>
+              <a:rPr lang="en-US" sz="3600" dirty="0" err="1"/>
+              <a:t>Các</a:t>
+            </a:r>
+            <a:r>
+              <a:rPr lang="en-US" sz="3600" dirty="0"/>
+              <a:t> </a:t>
+            </a:r>
+            <a:r>
+              <a:rPr lang="en-US" sz="3600" dirty="0" err="1"/>
+              <a:t>giao</a:t>
+            </a:r>
+            <a:r>
+              <a:rPr lang="en-US" sz="3600" dirty="0"/>
+              <a:t> </a:t>
+            </a:r>
+            <a:r>
+              <a:rPr lang="en-US" sz="3600" dirty="0" err="1"/>
+              <a:t>dịch</a:t>
+            </a:r>
+            <a:r>
+              <a:rPr lang="en-US" sz="3600" dirty="0"/>
+              <a:t> </a:t>
+            </a:r>
+            <a:r>
+              <a:rPr lang="en-US" sz="3600" dirty="0" err="1"/>
+              <a:t>trả</a:t>
+            </a:r>
+            <a:r>
+              <a:rPr lang="en-US" sz="3600" dirty="0"/>
+              <a:t> </a:t>
+            </a:r>
+            <a:r>
+              <a:rPr lang="en-US" sz="3600" dirty="0" err="1"/>
+              <a:t>lại</a:t>
+            </a:r>
+            <a:r>
+              <a:rPr lang="en-US" sz="3600" dirty="0"/>
+              <a:t> </a:t>
+            </a:r>
+            <a:r>
+              <a:rPr lang="en-US" sz="3600" dirty="0" err="1"/>
+              <a:t>hàng</a:t>
+            </a:r>
+            <a:endParaRPr lang="en-US" sz="3600" dirty="0"/>
+          </a:p>
+        </p:txBody>
+      </p:sp>
+      <p:sp>
+        <p:nvSpPr>
+          <p:cNvPr id="3" name="Content Placeholder 2"/>
+          <p:cNvSpPr>
+            <a:spLocks noGrp="1"/>
+          </p:cNvSpPr>
+          <p:nvPr>
+            <p:ph sz="quarter" idx="1"/>
+          </p:nvPr>
+        </p:nvSpPr>
+        <p:spPr>
+          <a:xfrm>
+            <a:off x="677334" y="1360489"/>
+            <a:ext cx="8596668" cy="3880773"/>
+          </a:xfrm>
+        </p:spPr>
+        <p:txBody>
           <a:bodyPr/>
           <a:lstStyle/>
           <a:p>
-            <a:endParaRPr lang="en-US"/>
-          </a:p>
-        </p:txBody>
-      </p:sp>
+            <a:r>
+              <a:rPr lang="en-US" dirty="0"/>
+              <a:t>7.2 </a:t>
+            </a:r>
+            <a:r>
+              <a:rPr lang="en-US" dirty="0" err="1"/>
+              <a:t>Danh</a:t>
+            </a:r>
+            <a:r>
+              <a:rPr lang="en-US" dirty="0"/>
+              <a:t> </a:t>
+            </a:r>
+            <a:r>
+              <a:rPr lang="en-US" dirty="0" err="1"/>
+              <a:t>sách</a:t>
+            </a:r>
+            <a:r>
+              <a:rPr lang="en-US" dirty="0"/>
+              <a:t> </a:t>
+            </a:r>
+            <a:r>
+              <a:rPr lang="en-US" sz="2800" dirty="0" err="1"/>
+              <a:t>các</a:t>
+            </a:r>
+            <a:r>
+              <a:rPr lang="en-US" sz="2800" dirty="0"/>
+              <a:t> </a:t>
+            </a:r>
+            <a:r>
+              <a:rPr lang="en-US" sz="2800" dirty="0" err="1"/>
+              <a:t>giao</a:t>
+            </a:r>
+            <a:r>
+              <a:rPr lang="en-US" sz="2800" dirty="0"/>
+              <a:t> </a:t>
+            </a:r>
+            <a:r>
+              <a:rPr lang="en-US" sz="2800" dirty="0" err="1"/>
+              <a:t>dịch</a:t>
+            </a:r>
+            <a:r>
+              <a:rPr lang="en-US" sz="2800" dirty="0"/>
+              <a:t> </a:t>
+            </a:r>
+            <a:r>
+              <a:rPr lang="en-US" sz="2800" dirty="0" err="1"/>
+              <a:t>trả</a:t>
+            </a:r>
+            <a:r>
+              <a:rPr lang="en-US" sz="2800" dirty="0"/>
+              <a:t> </a:t>
+            </a:r>
+            <a:r>
+              <a:rPr lang="en-US" sz="2800" dirty="0" err="1"/>
+              <a:t>lại</a:t>
+            </a:r>
+            <a:r>
+              <a:rPr lang="en-US" sz="2800" dirty="0"/>
+              <a:t> </a:t>
+            </a:r>
+            <a:r>
+              <a:rPr lang="en-US" sz="2800" dirty="0" err="1"/>
+              <a:t>hàng</a:t>
+            </a:r>
+            <a:r>
+              <a:rPr lang="en-US" sz="2800" dirty="0"/>
+              <a:t> </a:t>
+            </a:r>
+            <a:r>
+              <a:rPr lang="en-US" dirty="0"/>
+              <a:t>:</a:t>
+            </a:r>
+          </a:p>
+        </p:txBody>
+      </p:sp>
+      <p:pic>
+        <p:nvPicPr>
+          <p:cNvPr id="4" name="Picture 3"/>
+          <p:cNvPicPr>
+            <a:picLocks noChangeAspect="1"/>
+          </p:cNvPicPr>
+          <p:nvPr/>
+        </p:nvPicPr>
+        <p:blipFill>
+          <a:blip r:embed="rId2"/>
+          <a:stretch>
+            <a:fillRect/>
+          </a:stretch>
+        </p:blipFill>
+        <p:spPr>
+          <a:xfrm>
+            <a:off x="590550" y="2224087"/>
+            <a:ext cx="11010900" cy="2409825"/>
+          </a:xfrm>
+          <a:prstGeom prst="rect">
+            <a:avLst/>
+          </a:prstGeom>
+        </p:spPr>
+      </p:pic>
+    </p:spTree>
+    <p:extLst>
+      <p:ext uri="{BB962C8B-B14F-4D97-AF65-F5344CB8AC3E}">
+        <p14:creationId xmlns:p14="http://schemas.microsoft.com/office/powerpoint/2010/main" val="1629473028"/>
+      </p:ext>
+    </p:extLst>
+  </p:cSld>
+  <p:clrMapOvr>
+    <a:masterClrMapping/>
+  </p:clrMapOvr>
+</p:sld>
+</file>
+
+<file path=ppt/slides/slide17.xml><?xml version="1.0" encoding="utf-8"?>
+<p:sld xmlns:a="http://schemas.openxmlformats.org/drawingml/2006/main" xmlns:r="http://schemas.openxmlformats.org/officeDocument/2006/relationships" xmlns:p="http://schemas.openxmlformats.org/presentationml/2006/main">
+  <p:cSld>
+    <p:spTree>
+      <p:nvGrpSpPr>
+        <p:cNvPr id="1" name=""/>
+        <p:cNvGrpSpPr/>
+        <p:nvPr/>
+      </p:nvGrpSpPr>
+      <p:grpSpPr>
+        <a:xfrm>
+          <a:off x="0" y="0"/>
+          <a:ext cx="0" cy="0"/>
+          <a:chOff x="0" y="0"/>
+          <a:chExt cx="0" cy="0"/>
+        </a:xfrm>
+      </p:grpSpPr>
+      <p:sp>
+        <p:nvSpPr>
+          <p:cNvPr id="2" name="Title 1"/>
+          <p:cNvSpPr>
+            <a:spLocks noGrp="1"/>
+          </p:cNvSpPr>
+          <p:nvPr>
+            <p:ph type="title"/>
+          </p:nvPr>
+        </p:nvSpPr>
+        <p:spPr/>
+        <p:txBody>
+          <a:bodyPr>
+            <a:normAutofit/>
+          </a:bodyPr>
+          <a:lstStyle/>
+          <a:p>
+            <a:r>
+              <a:rPr lang="en-US" sz="3600" dirty="0"/>
+              <a:t>8. </a:t>
+            </a:r>
+            <a:r>
+              <a:rPr lang="en-US" sz="3600" dirty="0" err="1"/>
+              <a:t>Phiếu</a:t>
+            </a:r>
+            <a:r>
+              <a:rPr lang="en-US" sz="3600" dirty="0"/>
+              <a:t> </a:t>
+            </a:r>
+            <a:r>
+              <a:rPr lang="en-US" sz="3600" dirty="0" err="1"/>
+              <a:t>xuất</a:t>
+            </a:r>
+            <a:r>
+              <a:rPr lang="en-US" sz="3600" dirty="0"/>
+              <a:t> </a:t>
+            </a:r>
+            <a:r>
+              <a:rPr lang="en-US" sz="3600" dirty="0" err="1"/>
+              <a:t>kho</a:t>
+            </a:r>
+            <a:r>
+              <a:rPr lang="en-US" sz="3600" dirty="0"/>
+              <a:t> </a:t>
+            </a:r>
+            <a:r>
+              <a:rPr lang="en-US" sz="3600" dirty="0" err="1"/>
+              <a:t>cho</a:t>
+            </a:r>
+            <a:r>
+              <a:rPr lang="en-US" sz="3600" dirty="0"/>
+              <a:t> </a:t>
+            </a:r>
+            <a:r>
+              <a:rPr lang="en-US" sz="3600" dirty="0" err="1"/>
+              <a:t>nhân</a:t>
+            </a:r>
+            <a:r>
+              <a:rPr lang="en-US" sz="3600" dirty="0"/>
+              <a:t> </a:t>
+            </a:r>
+            <a:r>
+              <a:rPr lang="en-US" sz="3600" dirty="0" err="1"/>
+              <a:t>viên</a:t>
+            </a:r>
+            <a:r>
+              <a:rPr lang="en-US" sz="3600" dirty="0"/>
+              <a:t> </a:t>
+            </a:r>
+            <a:r>
+              <a:rPr lang="en-US" sz="3600" dirty="0" err="1"/>
+              <a:t>bán</a:t>
+            </a:r>
+            <a:r>
+              <a:rPr lang="en-US" sz="3600" dirty="0"/>
+              <a:t> </a:t>
+            </a:r>
+            <a:r>
+              <a:rPr lang="en-US" sz="3600" dirty="0" err="1"/>
+              <a:t>hàng</a:t>
+            </a:r>
+            <a:endParaRPr lang="en-US" sz="3600" dirty="0"/>
+          </a:p>
+        </p:txBody>
+      </p:sp>
+      <p:sp>
+        <p:nvSpPr>
+          <p:cNvPr id="3" name="Content Placeholder 2"/>
+          <p:cNvSpPr>
+            <a:spLocks noGrp="1"/>
+          </p:cNvSpPr>
+          <p:nvPr>
+            <p:ph sz="quarter" idx="1"/>
+          </p:nvPr>
+        </p:nvSpPr>
+        <p:spPr>
+          <a:xfrm>
+            <a:off x="677334" y="1360489"/>
+            <a:ext cx="8596668" cy="3880773"/>
+          </a:xfrm>
+        </p:spPr>
+        <p:txBody>
+          <a:bodyPr/>
+          <a:lstStyle/>
+          <a:p>
+            <a:r>
+              <a:rPr lang="en-US" dirty="0"/>
+              <a:t>8.1 </a:t>
+            </a:r>
+            <a:r>
+              <a:rPr lang="en-US" dirty="0" err="1"/>
+              <a:t>Thêm</a:t>
+            </a:r>
+            <a:r>
+              <a:rPr lang="en-US" dirty="0"/>
+              <a:t> </a:t>
+            </a:r>
+            <a:r>
+              <a:rPr lang="en-US" sz="2800" dirty="0" err="1"/>
+              <a:t>các</a:t>
+            </a:r>
+            <a:r>
+              <a:rPr lang="en-US" sz="2800" dirty="0"/>
+              <a:t> </a:t>
+            </a:r>
+            <a:r>
+              <a:rPr lang="en-US" sz="2800" dirty="0" err="1"/>
+              <a:t>phiếu</a:t>
+            </a:r>
+            <a:r>
+              <a:rPr lang="en-US" sz="2800" dirty="0"/>
+              <a:t> </a:t>
+            </a:r>
+            <a:r>
+              <a:rPr lang="en-US" sz="2800" dirty="0" err="1"/>
+              <a:t>xuất</a:t>
+            </a:r>
+            <a:r>
+              <a:rPr lang="en-US" sz="2800" dirty="0"/>
+              <a:t> </a:t>
+            </a:r>
+            <a:r>
+              <a:rPr lang="en-US" sz="2800" dirty="0" err="1"/>
+              <a:t>kho</a:t>
+            </a:r>
+            <a:r>
+              <a:rPr lang="en-US" dirty="0"/>
+              <a:t>:</a:t>
+            </a:r>
+          </a:p>
+        </p:txBody>
+      </p:sp>
+      <p:pic>
+        <p:nvPicPr>
+          <p:cNvPr id="5" name="Picture 4"/>
+          <p:cNvPicPr>
+            <a:picLocks noChangeAspect="1"/>
+          </p:cNvPicPr>
+          <p:nvPr/>
+        </p:nvPicPr>
+        <p:blipFill>
+          <a:blip r:embed="rId2"/>
+          <a:stretch>
+            <a:fillRect/>
+          </a:stretch>
+        </p:blipFill>
+        <p:spPr>
+          <a:xfrm>
+            <a:off x="642937" y="2022532"/>
+            <a:ext cx="8328785" cy="4073467"/>
+          </a:xfrm>
+          <a:prstGeom prst="rect">
+            <a:avLst/>
+          </a:prstGeom>
+        </p:spPr>
+      </p:pic>
+    </p:spTree>
+    <p:extLst>
+      <p:ext uri="{BB962C8B-B14F-4D97-AF65-F5344CB8AC3E}">
+        <p14:creationId xmlns:p14="http://schemas.microsoft.com/office/powerpoint/2010/main" val="1541176167"/>
+      </p:ext>
+    </p:extLst>
+  </p:cSld>
+  <p:clrMapOvr>
+    <a:masterClrMapping/>
+  </p:clrMapOvr>
+</p:sld>
+</file>
+
+<file path=ppt/slides/slide18.xml><?xml version="1.0" encoding="utf-8"?>
+<p:sld xmlns:a="http://schemas.openxmlformats.org/drawingml/2006/main" xmlns:r="http://schemas.openxmlformats.org/officeDocument/2006/relationships" xmlns:p="http://schemas.openxmlformats.org/presentationml/2006/main">
+  <p:cSld>
+    <p:spTree>
+      <p:nvGrpSpPr>
+        <p:cNvPr id="1" name=""/>
+        <p:cNvGrpSpPr/>
+        <p:nvPr/>
+      </p:nvGrpSpPr>
+      <p:grpSpPr>
+        <a:xfrm>
+          <a:off x="0" y="0"/>
+          <a:ext cx="0" cy="0"/>
+          <a:chOff x="0" y="0"/>
+          <a:chExt cx="0" cy="0"/>
+        </a:xfrm>
+      </p:grpSpPr>
+      <p:sp>
+        <p:nvSpPr>
+          <p:cNvPr id="2" name="Title 1"/>
+          <p:cNvSpPr>
+            <a:spLocks noGrp="1"/>
+          </p:cNvSpPr>
+          <p:nvPr>
+            <p:ph type="title"/>
+          </p:nvPr>
+        </p:nvSpPr>
+        <p:spPr/>
+        <p:txBody>
+          <a:bodyPr>
+            <a:normAutofit/>
+          </a:bodyPr>
+          <a:lstStyle/>
+          <a:p>
+            <a:r>
+              <a:rPr lang="en-US" sz="3600" dirty="0"/>
+              <a:t>8. </a:t>
+            </a:r>
+            <a:r>
+              <a:rPr lang="en-US" sz="3600" dirty="0" err="1"/>
+              <a:t>Phiếu</a:t>
+            </a:r>
+            <a:r>
+              <a:rPr lang="en-US" sz="3600" dirty="0"/>
+              <a:t> </a:t>
+            </a:r>
+            <a:r>
+              <a:rPr lang="en-US" sz="3600" dirty="0" err="1"/>
+              <a:t>xuất</a:t>
+            </a:r>
+            <a:r>
+              <a:rPr lang="en-US" sz="3600" dirty="0"/>
+              <a:t> </a:t>
+            </a:r>
+            <a:r>
+              <a:rPr lang="en-US" sz="3600" dirty="0" err="1"/>
+              <a:t>kho</a:t>
+            </a:r>
+            <a:r>
+              <a:rPr lang="en-US" sz="3600" dirty="0"/>
+              <a:t> </a:t>
+            </a:r>
+            <a:r>
+              <a:rPr lang="en-US" sz="3600" dirty="0" err="1"/>
+              <a:t>cho</a:t>
+            </a:r>
+            <a:r>
+              <a:rPr lang="en-US" sz="3600" dirty="0"/>
+              <a:t> </a:t>
+            </a:r>
+            <a:r>
+              <a:rPr lang="en-US" sz="3600" dirty="0" err="1"/>
+              <a:t>nhân</a:t>
+            </a:r>
+            <a:r>
+              <a:rPr lang="en-US" sz="3600" dirty="0"/>
+              <a:t> </a:t>
+            </a:r>
+            <a:r>
+              <a:rPr lang="en-US" sz="3600" dirty="0" err="1"/>
+              <a:t>viên</a:t>
+            </a:r>
+            <a:r>
+              <a:rPr lang="en-US" sz="3600" dirty="0"/>
+              <a:t> </a:t>
+            </a:r>
+            <a:r>
+              <a:rPr lang="en-US" sz="3600" dirty="0" err="1"/>
+              <a:t>bán</a:t>
+            </a:r>
+            <a:r>
+              <a:rPr lang="en-US" sz="3600" dirty="0"/>
+              <a:t> </a:t>
+            </a:r>
+            <a:r>
+              <a:rPr lang="en-US" sz="3600" dirty="0" err="1"/>
+              <a:t>hàng</a:t>
+            </a:r>
+            <a:endParaRPr lang="en-US" sz="3600" dirty="0"/>
+          </a:p>
+        </p:txBody>
+      </p:sp>
+      <p:sp>
+        <p:nvSpPr>
+          <p:cNvPr id="3" name="Content Placeholder 2"/>
+          <p:cNvSpPr>
+            <a:spLocks noGrp="1"/>
+          </p:cNvSpPr>
+          <p:nvPr>
+            <p:ph sz="quarter" idx="1"/>
+          </p:nvPr>
+        </p:nvSpPr>
+        <p:spPr>
+          <a:xfrm>
+            <a:off x="677334" y="1360489"/>
+            <a:ext cx="8596668" cy="3880773"/>
+          </a:xfrm>
+        </p:spPr>
+        <p:txBody>
+          <a:bodyPr/>
+          <a:lstStyle/>
+          <a:p>
+            <a:r>
+              <a:rPr lang="en-US" dirty="0"/>
+              <a:t>8.2 </a:t>
+            </a:r>
+            <a:r>
+              <a:rPr lang="en-US" dirty="0" err="1"/>
+              <a:t>Danh</a:t>
+            </a:r>
+            <a:r>
+              <a:rPr lang="en-US" dirty="0"/>
+              <a:t> </a:t>
+            </a:r>
+            <a:r>
+              <a:rPr lang="en-US" dirty="0" err="1"/>
+              <a:t>sách</a:t>
+            </a:r>
+            <a:r>
+              <a:rPr lang="en-US" dirty="0"/>
+              <a:t> </a:t>
+            </a:r>
+            <a:r>
+              <a:rPr lang="en-US" sz="2800" dirty="0" err="1"/>
+              <a:t>các</a:t>
+            </a:r>
+            <a:r>
+              <a:rPr lang="en-US" sz="2800" dirty="0"/>
+              <a:t> </a:t>
+            </a:r>
+            <a:r>
+              <a:rPr lang="en-US" sz="2800" dirty="0" err="1"/>
+              <a:t>phiếu</a:t>
+            </a:r>
+            <a:r>
+              <a:rPr lang="en-US" sz="2800" dirty="0"/>
+              <a:t> </a:t>
+            </a:r>
+            <a:r>
+              <a:rPr lang="en-US" sz="2800" dirty="0" err="1"/>
+              <a:t>xuất</a:t>
+            </a:r>
+            <a:r>
+              <a:rPr lang="en-US" sz="2800" dirty="0"/>
+              <a:t> </a:t>
+            </a:r>
+            <a:r>
+              <a:rPr lang="en-US" sz="2800" dirty="0" err="1"/>
+              <a:t>kho</a:t>
+            </a:r>
+            <a:r>
+              <a:rPr lang="en-US" dirty="0"/>
+              <a:t>:</a:t>
+            </a:r>
+          </a:p>
+        </p:txBody>
+      </p:sp>
+      <p:pic>
+        <p:nvPicPr>
+          <p:cNvPr id="4" name="Picture 3"/>
+          <p:cNvPicPr>
+            <a:picLocks noChangeAspect="1"/>
+          </p:cNvPicPr>
+          <p:nvPr/>
+        </p:nvPicPr>
+        <p:blipFill>
+          <a:blip r:embed="rId2"/>
+          <a:stretch>
+            <a:fillRect/>
+          </a:stretch>
+        </p:blipFill>
+        <p:spPr>
+          <a:xfrm>
+            <a:off x="590550" y="2224087"/>
+            <a:ext cx="11010900" cy="2409825"/>
+          </a:xfrm>
+          <a:prstGeom prst="rect">
+            <a:avLst/>
+          </a:prstGeom>
+        </p:spPr>
+      </p:pic>
+      <p:pic>
+        <p:nvPicPr>
+          <p:cNvPr id="5" name="Picture 4"/>
+          <p:cNvPicPr>
+            <a:picLocks noChangeAspect="1"/>
+          </p:cNvPicPr>
+          <p:nvPr/>
+        </p:nvPicPr>
+        <p:blipFill>
+          <a:blip r:embed="rId3"/>
+          <a:stretch>
+            <a:fillRect/>
+          </a:stretch>
+        </p:blipFill>
+        <p:spPr>
+          <a:xfrm>
+            <a:off x="595312" y="2195512"/>
+            <a:ext cx="11001375" cy="2466975"/>
+          </a:xfrm>
+          <a:prstGeom prst="rect">
+            <a:avLst/>
+          </a:prstGeom>
+        </p:spPr>
+      </p:pic>
+    </p:spTree>
+    <p:extLst>
+      <p:ext uri="{BB962C8B-B14F-4D97-AF65-F5344CB8AC3E}">
+        <p14:creationId xmlns:p14="http://schemas.microsoft.com/office/powerpoint/2010/main" val="639235876"/>
+      </p:ext>
+    </p:extLst>
+  </p:cSld>
+  <p:clrMapOvr>
+    <a:masterClrMapping/>
+  </p:clrMapOvr>
+</p:sld>
+</file>
+
+<file path=ppt/slides/slide19.xml><?xml version="1.0" encoding="utf-8"?>
+<p:sld xmlns:a="http://schemas.openxmlformats.org/drawingml/2006/main" xmlns:r="http://schemas.openxmlformats.org/officeDocument/2006/relationships" xmlns:p="http://schemas.openxmlformats.org/presentationml/2006/main">
+  <p:cSld>
+    <p:spTree>
+      <p:nvGrpSpPr>
+        <p:cNvPr id="1" name=""/>
+        <p:cNvGrpSpPr/>
+        <p:nvPr/>
+      </p:nvGrpSpPr>
+      <p:grpSpPr>
+        <a:xfrm>
+          <a:off x="0" y="0"/>
+          <a:ext cx="0" cy="0"/>
+          <a:chOff x="0" y="0"/>
+          <a:chExt cx="0" cy="0"/>
+        </a:xfrm>
+      </p:grpSpPr>
+      <p:sp>
+        <p:nvSpPr>
+          <p:cNvPr id="2" name="Title 1"/>
+          <p:cNvSpPr>
+            <a:spLocks noGrp="1"/>
+          </p:cNvSpPr>
+          <p:nvPr>
+            <p:ph type="title"/>
+          </p:nvPr>
+        </p:nvSpPr>
+        <p:spPr/>
+        <p:txBody>
+          <a:bodyPr/>
+          <a:lstStyle/>
+          <a:p>
+            <a:r>
+              <a:rPr lang="en-US" dirty="0"/>
+              <a:t>9. </a:t>
+            </a:r>
+            <a:r>
+              <a:rPr lang="en-US" dirty="0" err="1"/>
+              <a:t>Quản</a:t>
+            </a:r>
+            <a:r>
+              <a:rPr lang="en-US" dirty="0"/>
+              <a:t> </a:t>
+            </a:r>
+            <a:r>
+              <a:rPr lang="en-US" dirty="0" err="1"/>
+              <a:t>lí</a:t>
+            </a:r>
+            <a:r>
+              <a:rPr lang="en-US" dirty="0"/>
+              <a:t> </a:t>
+            </a:r>
+            <a:r>
+              <a:rPr lang="en-US" dirty="0" err="1"/>
+              <a:t>khách</a:t>
+            </a:r>
+            <a:r>
+              <a:rPr lang="en-US" dirty="0"/>
+              <a:t> </a:t>
+            </a:r>
+            <a:r>
+              <a:rPr lang="en-US" dirty="0" err="1"/>
+              <a:t>hàng</a:t>
+            </a:r>
+            <a:endParaRPr lang="en-US" dirty="0"/>
+          </a:p>
+        </p:txBody>
+      </p:sp>
+      <p:sp>
+        <p:nvSpPr>
+          <p:cNvPr id="3" name="Content Placeholder 2"/>
+          <p:cNvSpPr>
+            <a:spLocks noGrp="1"/>
+          </p:cNvSpPr>
+          <p:nvPr>
+            <p:ph sz="quarter" idx="1"/>
+          </p:nvPr>
+        </p:nvSpPr>
+        <p:spPr/>
+        <p:txBody>
+          <a:bodyPr/>
+          <a:lstStyle/>
+          <a:p>
+            <a:r>
+              <a:rPr lang="en-US" dirty="0"/>
+              <a:t>9.2 </a:t>
+            </a:r>
+            <a:r>
+              <a:rPr lang="en-US" dirty="0" err="1"/>
+              <a:t>Danh</a:t>
+            </a:r>
+            <a:r>
+              <a:rPr lang="en-US" dirty="0"/>
+              <a:t> </a:t>
+            </a:r>
+            <a:r>
+              <a:rPr lang="en-US" dirty="0" err="1"/>
+              <a:t>sách</a:t>
+            </a:r>
+            <a:r>
+              <a:rPr lang="en-US" dirty="0"/>
+              <a:t> </a:t>
+            </a:r>
+            <a:r>
+              <a:rPr lang="en-US" sz="2400" dirty="0" err="1"/>
+              <a:t>khách</a:t>
+            </a:r>
+            <a:r>
+              <a:rPr lang="en-US" sz="2400" dirty="0"/>
+              <a:t> </a:t>
+            </a:r>
+            <a:r>
+              <a:rPr lang="en-US" sz="2400" dirty="0" err="1"/>
+              <a:t>hàng</a:t>
+            </a:r>
+            <a:r>
+              <a:rPr lang="en-US" dirty="0"/>
+              <a:t>:</a:t>
+            </a:r>
+            <a:endParaRPr lang="en-US" dirty="0"/>
+          </a:p>
+        </p:txBody>
+      </p:sp>
+      <p:pic>
+        <p:nvPicPr>
+          <p:cNvPr id="4" name="Picture 3"/>
+          <p:cNvPicPr>
+            <a:picLocks noChangeAspect="1"/>
+          </p:cNvPicPr>
+          <p:nvPr/>
+        </p:nvPicPr>
+        <p:blipFill>
+          <a:blip r:embed="rId2"/>
+          <a:stretch>
+            <a:fillRect/>
+          </a:stretch>
+        </p:blipFill>
+        <p:spPr>
+          <a:xfrm>
+            <a:off x="0" y="1916355"/>
+            <a:ext cx="12192000" cy="4115536"/>
+          </a:xfrm>
+          <a:prstGeom prst="rect">
+            <a:avLst/>
+          </a:prstGeom>
+        </p:spPr>
+      </p:pic>
     </p:spTree>
     <p:extLst>
       <p:ext uri="{BB962C8B-B14F-4D97-AF65-F5344CB8AC3E}">
@@ -5250,6 +6613,264 @@
             </a:r>
           </a:p>
           <a:p>
+            <a:r>
+              <a:rPr lang="en-US" dirty="0" err="1"/>
+              <a:t>Thêm</a:t>
+            </a:r>
+            <a:r>
+              <a:rPr lang="en-US" dirty="0"/>
+              <a:t> </a:t>
+            </a:r>
+            <a:r>
+              <a:rPr lang="en-US" dirty="0" err="1"/>
+              <a:t>và</a:t>
+            </a:r>
+            <a:r>
+              <a:rPr lang="en-US" dirty="0"/>
+              <a:t> </a:t>
+            </a:r>
+            <a:r>
+              <a:rPr lang="en-US" dirty="0" err="1"/>
+              <a:t>xem</a:t>
+            </a:r>
+            <a:r>
+              <a:rPr lang="en-US" dirty="0"/>
+              <a:t> </a:t>
+            </a:r>
+            <a:r>
+              <a:rPr lang="en-US" dirty="0" err="1"/>
+              <a:t>danh</a:t>
+            </a:r>
+            <a:r>
+              <a:rPr lang="en-US" dirty="0"/>
+              <a:t> </a:t>
+            </a:r>
+            <a:r>
+              <a:rPr lang="en-US" dirty="0" err="1"/>
+              <a:t>sách</a:t>
+            </a:r>
+            <a:r>
+              <a:rPr lang="en-US" dirty="0"/>
+              <a:t> </a:t>
+            </a:r>
+            <a:r>
+              <a:rPr lang="en-US" dirty="0" err="1"/>
+              <a:t>hoá</a:t>
+            </a:r>
+            <a:r>
+              <a:rPr lang="en-US" dirty="0"/>
+              <a:t> đ</a:t>
+            </a:r>
+            <a:r>
+              <a:rPr lang="vi-VN" dirty="0"/>
+              <a:t>ơ</a:t>
+            </a:r>
+            <a:r>
+              <a:rPr lang="en-US" dirty="0"/>
+              <a:t>n </a:t>
+            </a:r>
+            <a:r>
+              <a:rPr lang="en-US" dirty="0" err="1"/>
+              <a:t>bán</a:t>
+            </a:r>
+            <a:r>
+              <a:rPr lang="en-US" dirty="0"/>
+              <a:t> </a:t>
+            </a:r>
+            <a:r>
+              <a:rPr lang="en-US" dirty="0" err="1"/>
+              <a:t>hàng</a:t>
+            </a:r>
+            <a:endParaRPr lang="en-US" dirty="0"/>
+          </a:p>
+          <a:p>
+            <a:r>
+              <a:rPr lang="en-US" dirty="0" err="1"/>
+              <a:t>Thêm</a:t>
+            </a:r>
+            <a:r>
+              <a:rPr lang="en-US" dirty="0"/>
+              <a:t> </a:t>
+            </a:r>
+            <a:r>
+              <a:rPr lang="en-US" dirty="0" err="1"/>
+              <a:t>và</a:t>
+            </a:r>
+            <a:r>
+              <a:rPr lang="en-US" dirty="0"/>
+              <a:t> </a:t>
+            </a:r>
+            <a:r>
+              <a:rPr lang="en-US" dirty="0" err="1"/>
+              <a:t>xem</a:t>
+            </a:r>
+            <a:r>
+              <a:rPr lang="en-US" dirty="0"/>
+              <a:t> </a:t>
+            </a:r>
+            <a:r>
+              <a:rPr lang="en-US" dirty="0" err="1"/>
+              <a:t>danh</a:t>
+            </a:r>
+            <a:r>
+              <a:rPr lang="en-US" dirty="0"/>
+              <a:t> </a:t>
+            </a:r>
+            <a:r>
+              <a:rPr lang="en-US" dirty="0" err="1"/>
+              <a:t>sách</a:t>
+            </a:r>
+            <a:r>
+              <a:rPr lang="en-US" dirty="0"/>
+              <a:t> </a:t>
+            </a:r>
+            <a:r>
+              <a:rPr lang="en-US" dirty="0" err="1"/>
+              <a:t>các</a:t>
+            </a:r>
+            <a:r>
+              <a:rPr lang="en-US" dirty="0"/>
+              <a:t> </a:t>
+            </a:r>
+            <a:r>
+              <a:rPr lang="en-US" dirty="0" err="1"/>
+              <a:t>giao</a:t>
+            </a:r>
+            <a:r>
+              <a:rPr lang="en-US" dirty="0"/>
+              <a:t> </a:t>
+            </a:r>
+            <a:r>
+              <a:rPr lang="en-US" dirty="0" err="1"/>
+              <a:t>dịch</a:t>
+            </a:r>
+            <a:r>
+              <a:rPr lang="en-US" dirty="0"/>
+              <a:t> </a:t>
+            </a:r>
+            <a:r>
+              <a:rPr lang="en-US" dirty="0" err="1"/>
+              <a:t>trả</a:t>
+            </a:r>
+            <a:r>
+              <a:rPr lang="en-US" dirty="0"/>
+              <a:t> </a:t>
+            </a:r>
+            <a:r>
+              <a:rPr lang="en-US" dirty="0" err="1"/>
+              <a:t>lại</a:t>
+            </a:r>
+            <a:r>
+              <a:rPr lang="en-US" dirty="0"/>
+              <a:t> </a:t>
+            </a:r>
+            <a:r>
+              <a:rPr lang="en-US" dirty="0" err="1"/>
+              <a:t>hàng</a:t>
+            </a:r>
+            <a:endParaRPr lang="en-US" dirty="0"/>
+          </a:p>
+          <a:p>
+            <a:r>
+              <a:rPr lang="en-US" dirty="0" err="1"/>
+              <a:t>Thêm</a:t>
+            </a:r>
+            <a:r>
+              <a:rPr lang="en-US" dirty="0"/>
+              <a:t> </a:t>
+            </a:r>
+            <a:r>
+              <a:rPr lang="en-US" dirty="0" err="1"/>
+              <a:t>và</a:t>
+            </a:r>
+            <a:r>
+              <a:rPr lang="en-US" dirty="0"/>
+              <a:t> </a:t>
+            </a:r>
+            <a:r>
+              <a:rPr lang="en-US" dirty="0" err="1"/>
+              <a:t>xem</a:t>
+            </a:r>
+            <a:r>
+              <a:rPr lang="en-US" dirty="0"/>
+              <a:t> </a:t>
+            </a:r>
+            <a:r>
+              <a:rPr lang="en-US" dirty="0" err="1"/>
+              <a:t>danh</a:t>
+            </a:r>
+            <a:r>
+              <a:rPr lang="en-US" dirty="0"/>
+              <a:t> </a:t>
+            </a:r>
+            <a:r>
+              <a:rPr lang="en-US" dirty="0" err="1"/>
+              <a:t>sách</a:t>
+            </a:r>
+            <a:r>
+              <a:rPr lang="en-US" dirty="0"/>
+              <a:t> </a:t>
+            </a:r>
+            <a:r>
+              <a:rPr lang="en-US" dirty="0" err="1"/>
+              <a:t>phiếu</a:t>
+            </a:r>
+            <a:r>
+              <a:rPr lang="en-US" dirty="0"/>
+              <a:t> </a:t>
+            </a:r>
+            <a:r>
+              <a:rPr lang="en-US" dirty="0" err="1"/>
+              <a:t>xuất</a:t>
+            </a:r>
+            <a:r>
+              <a:rPr lang="en-US" dirty="0"/>
+              <a:t> </a:t>
+            </a:r>
+            <a:r>
+              <a:rPr lang="en-US" dirty="0" err="1"/>
+              <a:t>kho</a:t>
+            </a:r>
+            <a:r>
+              <a:rPr lang="en-US" dirty="0"/>
+              <a:t> </a:t>
+            </a:r>
+            <a:r>
+              <a:rPr lang="en-US" dirty="0" err="1"/>
+              <a:t>cho</a:t>
+            </a:r>
+            <a:r>
+              <a:rPr lang="en-US" dirty="0"/>
+              <a:t> </a:t>
+            </a:r>
+            <a:r>
+              <a:rPr lang="en-US" dirty="0" err="1"/>
+              <a:t>nhân</a:t>
+            </a:r>
+            <a:r>
+              <a:rPr lang="en-US" dirty="0"/>
+              <a:t> </a:t>
+            </a:r>
+            <a:r>
+              <a:rPr lang="en-US" dirty="0" err="1"/>
+              <a:t>viên</a:t>
+            </a:r>
+            <a:r>
+              <a:rPr lang="en-US" dirty="0"/>
+              <a:t> </a:t>
+            </a:r>
+            <a:r>
+              <a:rPr lang="en-US" dirty="0" err="1"/>
+              <a:t>bán</a:t>
+            </a:r>
+            <a:r>
+              <a:rPr lang="en-US" dirty="0"/>
+              <a:t> </a:t>
+            </a:r>
+            <a:r>
+              <a:rPr lang="en-US" dirty="0" err="1"/>
+              <a:t>hàng</a:t>
+            </a:r>
             <a:endParaRPr lang="en-US" dirty="0"/>
           </a:p>
         </p:txBody>
@@ -5258,6 +6879,814 @@
     <p:extLst>
       <p:ext uri="{BB962C8B-B14F-4D97-AF65-F5344CB8AC3E}">
         <p14:creationId xmlns:p14="http://schemas.microsoft.com/office/powerpoint/2010/main" val="3670952586"/>
+      </p:ext>
+    </p:extLst>
+  </p:cSld>
+  <p:clrMapOvr>
+    <a:masterClrMapping/>
+  </p:clrMapOvr>
+</p:sld>
+</file>
+
+<file path=ppt/slides/slide20.xml><?xml version="1.0" encoding="utf-8"?>
+<p:sld xmlns:a="http://schemas.openxmlformats.org/drawingml/2006/main" xmlns:r="http://schemas.openxmlformats.org/officeDocument/2006/relationships" xmlns:p="http://schemas.openxmlformats.org/presentationml/2006/main">
+  <p:cSld>
+    <p:spTree>
+      <p:nvGrpSpPr>
+        <p:cNvPr id="1" name=""/>
+        <p:cNvGrpSpPr/>
+        <p:nvPr/>
+      </p:nvGrpSpPr>
+      <p:grpSpPr>
+        <a:xfrm>
+          <a:off x="0" y="0"/>
+          <a:ext cx="0" cy="0"/>
+          <a:chOff x="0" y="0"/>
+          <a:chExt cx="0" cy="0"/>
+        </a:xfrm>
+      </p:grpSpPr>
+      <p:sp>
+        <p:nvSpPr>
+          <p:cNvPr id="2" name="Title 1"/>
+          <p:cNvSpPr>
+            <a:spLocks noGrp="1"/>
+          </p:cNvSpPr>
+          <p:nvPr>
+            <p:ph type="title"/>
+          </p:nvPr>
+        </p:nvSpPr>
+        <p:spPr/>
+        <p:txBody>
+          <a:bodyPr/>
+          <a:lstStyle/>
+          <a:p>
+            <a:r>
+              <a:rPr lang="en-US" dirty="0"/>
+              <a:t>9</a:t>
+            </a:r>
+            <a:r>
+              <a:rPr lang="en-US" dirty="0"/>
+              <a:t>. </a:t>
+            </a:r>
+            <a:r>
+              <a:rPr lang="en-US" dirty="0" err="1"/>
+              <a:t>Quản</a:t>
+            </a:r>
+            <a:r>
+              <a:rPr lang="en-US" dirty="0"/>
+              <a:t> </a:t>
+            </a:r>
+            <a:r>
+              <a:rPr lang="en-US" dirty="0" err="1"/>
+              <a:t>lí</a:t>
+            </a:r>
+            <a:r>
+              <a:rPr lang="en-US" dirty="0"/>
+              <a:t> </a:t>
+            </a:r>
+            <a:r>
+              <a:rPr lang="en-US" dirty="0" err="1"/>
+              <a:t>khách</a:t>
+            </a:r>
+            <a:r>
+              <a:rPr lang="en-US" dirty="0"/>
+              <a:t> </a:t>
+            </a:r>
+            <a:r>
+              <a:rPr lang="en-US" dirty="0" err="1"/>
+              <a:t>hàng</a:t>
+            </a:r>
+            <a:endParaRPr lang="en-US" dirty="0"/>
+          </a:p>
+        </p:txBody>
+      </p:sp>
+      <p:sp>
+        <p:nvSpPr>
+          <p:cNvPr id="3" name="Content Placeholder 2"/>
+          <p:cNvSpPr>
+            <a:spLocks noGrp="1"/>
+          </p:cNvSpPr>
+          <p:nvPr>
+            <p:ph sz="quarter" idx="1"/>
+          </p:nvPr>
+        </p:nvSpPr>
+        <p:spPr/>
+        <p:txBody>
+          <a:bodyPr/>
+          <a:lstStyle/>
+          <a:p>
+            <a:r>
+              <a:rPr lang="en-US" dirty="0"/>
+              <a:t>9</a:t>
+            </a:r>
+            <a:r>
+              <a:rPr lang="en-US" dirty="0"/>
+              <a:t>.1 </a:t>
+            </a:r>
+            <a:r>
+              <a:rPr lang="en-US" dirty="0" err="1"/>
+              <a:t>Thêm</a:t>
+            </a:r>
+            <a:r>
+              <a:rPr lang="en-US" dirty="0"/>
+              <a:t> </a:t>
+            </a:r>
+            <a:r>
+              <a:rPr lang="en-US" sz="2400" dirty="0" err="1"/>
+              <a:t>khách</a:t>
+            </a:r>
+            <a:r>
+              <a:rPr lang="en-US" sz="2400" dirty="0"/>
+              <a:t> </a:t>
+            </a:r>
+            <a:r>
+              <a:rPr lang="en-US" sz="2400" dirty="0" err="1"/>
+              <a:t>hàng</a:t>
+            </a:r>
+            <a:r>
+              <a:rPr lang="en-US" dirty="0"/>
+              <a:t>:</a:t>
+            </a:r>
+            <a:endParaRPr lang="en-US" dirty="0"/>
+          </a:p>
+        </p:txBody>
+      </p:sp>
+      <p:pic>
+        <p:nvPicPr>
+          <p:cNvPr id="5" name="Picture 4"/>
+          <p:cNvPicPr>
+            <a:picLocks noChangeAspect="1"/>
+          </p:cNvPicPr>
+          <p:nvPr/>
+        </p:nvPicPr>
+        <p:blipFill>
+          <a:blip r:embed="rId2"/>
+          <a:stretch>
+            <a:fillRect/>
+          </a:stretch>
+        </p:blipFill>
+        <p:spPr>
+          <a:xfrm>
+            <a:off x="1285143" y="1704303"/>
+            <a:ext cx="10297257" cy="4452658"/>
+          </a:xfrm>
+          <a:prstGeom prst="rect">
+            <a:avLst/>
+          </a:prstGeom>
+        </p:spPr>
+      </p:pic>
+    </p:spTree>
+    <p:extLst>
+      <p:ext uri="{BB962C8B-B14F-4D97-AF65-F5344CB8AC3E}">
+        <p14:creationId xmlns:p14="http://schemas.microsoft.com/office/powerpoint/2010/main" val="638150514"/>
+      </p:ext>
+    </p:extLst>
+  </p:cSld>
+  <p:clrMapOvr>
+    <a:masterClrMapping/>
+  </p:clrMapOvr>
+</p:sld>
+</file>
+
+<file path=ppt/slides/slide21.xml><?xml version="1.0" encoding="utf-8"?>
+<p:sld xmlns:a="http://schemas.openxmlformats.org/drawingml/2006/main" xmlns:r="http://schemas.openxmlformats.org/officeDocument/2006/relationships" xmlns:p="http://schemas.openxmlformats.org/presentationml/2006/main">
+  <p:cSld>
+    <p:spTree>
+      <p:nvGrpSpPr>
+        <p:cNvPr id="1" name=""/>
+        <p:cNvGrpSpPr/>
+        <p:nvPr/>
+      </p:nvGrpSpPr>
+      <p:grpSpPr>
+        <a:xfrm>
+          <a:off x="0" y="0"/>
+          <a:ext cx="0" cy="0"/>
+          <a:chOff x="0" y="0"/>
+          <a:chExt cx="0" cy="0"/>
+        </a:xfrm>
+      </p:grpSpPr>
+      <p:sp>
+        <p:nvSpPr>
+          <p:cNvPr id="2" name="Title 1"/>
+          <p:cNvSpPr>
+            <a:spLocks noGrp="1"/>
+          </p:cNvSpPr>
+          <p:nvPr>
+            <p:ph type="title"/>
+          </p:nvPr>
+        </p:nvSpPr>
+        <p:spPr/>
+        <p:txBody>
+          <a:bodyPr/>
+          <a:lstStyle/>
+          <a:p>
+            <a:r>
+              <a:rPr lang="en-US" dirty="0"/>
+              <a:t>10. </a:t>
+            </a:r>
+            <a:r>
+              <a:rPr lang="en-US" dirty="0" err="1"/>
+              <a:t>Quản</a:t>
+            </a:r>
+            <a:r>
+              <a:rPr lang="en-US" dirty="0"/>
+              <a:t> </a:t>
+            </a:r>
+            <a:r>
+              <a:rPr lang="en-US" dirty="0" err="1"/>
+              <a:t>lí</a:t>
+            </a:r>
+            <a:r>
+              <a:rPr lang="en-US" dirty="0"/>
+              <a:t> </a:t>
+            </a:r>
+            <a:r>
+              <a:rPr lang="en-US" dirty="0" err="1"/>
+              <a:t>sản</a:t>
+            </a:r>
+            <a:r>
+              <a:rPr lang="en-US" dirty="0"/>
+              <a:t> </a:t>
+            </a:r>
+            <a:r>
+              <a:rPr lang="en-US" dirty="0" err="1"/>
+              <a:t>phẩm</a:t>
+            </a:r>
+            <a:endParaRPr lang="en-US" dirty="0"/>
+          </a:p>
+        </p:txBody>
+      </p:sp>
+      <p:sp>
+        <p:nvSpPr>
+          <p:cNvPr id="3" name="Content Placeholder 2"/>
+          <p:cNvSpPr>
+            <a:spLocks noGrp="1"/>
+          </p:cNvSpPr>
+          <p:nvPr>
+            <p:ph sz="quarter" idx="1"/>
+          </p:nvPr>
+        </p:nvSpPr>
+        <p:spPr/>
+        <p:txBody>
+          <a:bodyPr/>
+          <a:lstStyle/>
+          <a:p>
+            <a:r>
+              <a:rPr lang="en-US" dirty="0"/>
+              <a:t>10.1 </a:t>
+            </a:r>
+            <a:r>
+              <a:rPr lang="en-US" dirty="0" err="1"/>
+              <a:t>Danh</a:t>
+            </a:r>
+            <a:r>
+              <a:rPr lang="en-US" dirty="0"/>
+              <a:t> </a:t>
+            </a:r>
+            <a:r>
+              <a:rPr lang="en-US" dirty="0" err="1"/>
+              <a:t>sách</a:t>
+            </a:r>
+            <a:r>
+              <a:rPr lang="en-US" dirty="0"/>
+              <a:t> </a:t>
+            </a:r>
+            <a:r>
+              <a:rPr lang="en-US" sz="2400" dirty="0" err="1"/>
+              <a:t>sản</a:t>
+            </a:r>
+            <a:r>
+              <a:rPr lang="en-US" sz="2400" dirty="0"/>
+              <a:t> </a:t>
+            </a:r>
+            <a:r>
+              <a:rPr lang="en-US" sz="2400" dirty="0" err="1"/>
+              <a:t>phẩm</a:t>
+            </a:r>
+            <a:r>
+              <a:rPr lang="en-US" dirty="0"/>
+              <a:t>:</a:t>
+            </a:r>
+            <a:endParaRPr lang="en-US" dirty="0"/>
+          </a:p>
+        </p:txBody>
+      </p:sp>
+      <p:pic>
+        <p:nvPicPr>
+          <p:cNvPr id="4" name="Picture 3"/>
+          <p:cNvPicPr>
+            <a:picLocks noChangeAspect="1"/>
+          </p:cNvPicPr>
+          <p:nvPr/>
+        </p:nvPicPr>
+        <p:blipFill>
+          <a:blip r:embed="rId2"/>
+          <a:stretch>
+            <a:fillRect/>
+          </a:stretch>
+        </p:blipFill>
+        <p:spPr>
+          <a:xfrm>
+            <a:off x="0" y="1850003"/>
+            <a:ext cx="12192000" cy="4306957"/>
+          </a:xfrm>
+          <a:prstGeom prst="rect">
+            <a:avLst/>
+          </a:prstGeom>
+        </p:spPr>
+      </p:pic>
+    </p:spTree>
+    <p:extLst>
+      <p:ext uri="{BB962C8B-B14F-4D97-AF65-F5344CB8AC3E}">
+        <p14:creationId xmlns:p14="http://schemas.microsoft.com/office/powerpoint/2010/main" val="4132860819"/>
+      </p:ext>
+    </p:extLst>
+  </p:cSld>
+  <p:clrMapOvr>
+    <a:masterClrMapping/>
+  </p:clrMapOvr>
+</p:sld>
+</file>
+
+<file path=ppt/slides/slide22.xml><?xml version="1.0" encoding="utf-8"?>
+<p:sld xmlns:a="http://schemas.openxmlformats.org/drawingml/2006/main" xmlns:r="http://schemas.openxmlformats.org/officeDocument/2006/relationships" xmlns:p="http://schemas.openxmlformats.org/presentationml/2006/main">
+  <p:cSld>
+    <p:spTree>
+      <p:nvGrpSpPr>
+        <p:cNvPr id="1" name=""/>
+        <p:cNvGrpSpPr/>
+        <p:nvPr/>
+      </p:nvGrpSpPr>
+      <p:grpSpPr>
+        <a:xfrm>
+          <a:off x="0" y="0"/>
+          <a:ext cx="0" cy="0"/>
+          <a:chOff x="0" y="0"/>
+          <a:chExt cx="0" cy="0"/>
+        </a:xfrm>
+      </p:grpSpPr>
+      <p:sp>
+        <p:nvSpPr>
+          <p:cNvPr id="2" name="Title 1"/>
+          <p:cNvSpPr>
+            <a:spLocks noGrp="1"/>
+          </p:cNvSpPr>
+          <p:nvPr>
+            <p:ph type="title"/>
+          </p:nvPr>
+        </p:nvSpPr>
+        <p:spPr/>
+        <p:txBody>
+          <a:bodyPr/>
+          <a:lstStyle/>
+          <a:p>
+            <a:r>
+              <a:rPr lang="en-US" dirty="0"/>
+              <a:t>10. </a:t>
+            </a:r>
+            <a:r>
+              <a:rPr lang="en-US" dirty="0" err="1"/>
+              <a:t>Quản</a:t>
+            </a:r>
+            <a:r>
+              <a:rPr lang="en-US" dirty="0"/>
+              <a:t> </a:t>
+            </a:r>
+            <a:r>
+              <a:rPr lang="en-US" dirty="0" err="1"/>
+              <a:t>lí</a:t>
+            </a:r>
+            <a:r>
+              <a:rPr lang="en-US" dirty="0"/>
+              <a:t> </a:t>
+            </a:r>
+            <a:r>
+              <a:rPr lang="en-US" dirty="0" err="1"/>
+              <a:t>sản</a:t>
+            </a:r>
+            <a:r>
+              <a:rPr lang="en-US" dirty="0"/>
+              <a:t> </a:t>
+            </a:r>
+            <a:r>
+              <a:rPr lang="en-US" dirty="0" err="1"/>
+              <a:t>phẩm</a:t>
+            </a:r>
+            <a:endParaRPr lang="en-US" dirty="0"/>
+          </a:p>
+        </p:txBody>
+      </p:sp>
+      <p:sp>
+        <p:nvSpPr>
+          <p:cNvPr id="3" name="Content Placeholder 2"/>
+          <p:cNvSpPr>
+            <a:spLocks noGrp="1"/>
+          </p:cNvSpPr>
+          <p:nvPr>
+            <p:ph sz="quarter" idx="1"/>
+          </p:nvPr>
+        </p:nvSpPr>
+        <p:spPr/>
+        <p:txBody>
+          <a:bodyPr/>
+          <a:lstStyle/>
+          <a:p>
+            <a:r>
+              <a:rPr lang="en-US" dirty="0"/>
+              <a:t>10.2 </a:t>
+            </a:r>
+            <a:r>
+              <a:rPr lang="en-US" dirty="0" err="1"/>
+              <a:t>Thêm</a:t>
+            </a:r>
+            <a:r>
+              <a:rPr lang="en-US" dirty="0"/>
+              <a:t> </a:t>
+            </a:r>
+            <a:r>
+              <a:rPr lang="en-US" sz="2400" dirty="0" err="1"/>
+              <a:t>sản</a:t>
+            </a:r>
+            <a:r>
+              <a:rPr lang="en-US" sz="2400" dirty="0"/>
+              <a:t> </a:t>
+            </a:r>
+            <a:r>
+              <a:rPr lang="en-US" sz="2400" dirty="0" err="1"/>
+              <a:t>phẩm</a:t>
+            </a:r>
+            <a:r>
+              <a:rPr lang="en-US" dirty="0"/>
+              <a:t>:</a:t>
+            </a:r>
+            <a:endParaRPr lang="en-US" dirty="0"/>
+          </a:p>
+        </p:txBody>
+      </p:sp>
+      <p:pic>
+        <p:nvPicPr>
+          <p:cNvPr id="5" name="Picture 4"/>
+          <p:cNvPicPr>
+            <a:picLocks noChangeAspect="1"/>
+          </p:cNvPicPr>
+          <p:nvPr/>
+        </p:nvPicPr>
+        <p:blipFill>
+          <a:blip r:embed="rId2"/>
+          <a:stretch>
+            <a:fillRect/>
+          </a:stretch>
+        </p:blipFill>
+        <p:spPr>
+          <a:xfrm>
+            <a:off x="0" y="1670538"/>
+            <a:ext cx="12078479" cy="4677507"/>
+          </a:xfrm>
+          <a:prstGeom prst="rect">
+            <a:avLst/>
+          </a:prstGeom>
+        </p:spPr>
+      </p:pic>
+    </p:spTree>
+    <p:extLst>
+      <p:ext uri="{BB962C8B-B14F-4D97-AF65-F5344CB8AC3E}">
+        <p14:creationId xmlns:p14="http://schemas.microsoft.com/office/powerpoint/2010/main" val="3830462802"/>
+      </p:ext>
+    </p:extLst>
+  </p:cSld>
+  <p:clrMapOvr>
+    <a:masterClrMapping/>
+  </p:clrMapOvr>
+</p:sld>
+</file>
+
+<file path=ppt/slides/slide23.xml><?xml version="1.0" encoding="utf-8"?>
+<p:sld xmlns:a="http://schemas.openxmlformats.org/drawingml/2006/main" xmlns:r="http://schemas.openxmlformats.org/officeDocument/2006/relationships" xmlns:p="http://schemas.openxmlformats.org/presentationml/2006/main">
+  <p:cSld>
+    <p:spTree>
+      <p:nvGrpSpPr>
+        <p:cNvPr id="1" name=""/>
+        <p:cNvGrpSpPr/>
+        <p:nvPr/>
+      </p:nvGrpSpPr>
+      <p:grpSpPr>
+        <a:xfrm>
+          <a:off x="0" y="0"/>
+          <a:ext cx="0" cy="0"/>
+          <a:chOff x="0" y="0"/>
+          <a:chExt cx="0" cy="0"/>
+        </a:xfrm>
+      </p:grpSpPr>
+      <p:sp>
+        <p:nvSpPr>
+          <p:cNvPr id="2" name="Title 1"/>
+          <p:cNvSpPr>
+            <a:spLocks noGrp="1"/>
+          </p:cNvSpPr>
+          <p:nvPr>
+            <p:ph type="title"/>
+          </p:nvPr>
+        </p:nvSpPr>
+        <p:spPr/>
+        <p:txBody>
+          <a:bodyPr/>
+          <a:lstStyle/>
+          <a:p>
+            <a:r>
+              <a:rPr lang="en-US" dirty="0"/>
+              <a:t>11. </a:t>
+            </a:r>
+            <a:r>
+              <a:rPr lang="en-US" dirty="0" err="1"/>
+              <a:t>Quản</a:t>
+            </a:r>
+            <a:r>
+              <a:rPr lang="en-US" dirty="0"/>
+              <a:t> </a:t>
+            </a:r>
+            <a:r>
+              <a:rPr lang="en-US" dirty="0" err="1"/>
+              <a:t>lí</a:t>
+            </a:r>
+            <a:r>
+              <a:rPr lang="en-US" dirty="0"/>
+              <a:t> ng</a:t>
+            </a:r>
+            <a:r>
+              <a:rPr lang="vi-VN" dirty="0"/>
+              <a:t>ư</a:t>
+            </a:r>
+            <a:r>
+              <a:rPr lang="en-US" dirty="0" err="1"/>
+              <a:t>ời</a:t>
+            </a:r>
+            <a:r>
+              <a:rPr lang="en-US" dirty="0"/>
+              <a:t> </a:t>
+            </a:r>
+            <a:r>
+              <a:rPr lang="en-US" dirty="0" err="1"/>
+              <a:t>bán</a:t>
+            </a:r>
+            <a:r>
+              <a:rPr lang="en-US" dirty="0"/>
+              <a:t> </a:t>
+            </a:r>
+            <a:r>
+              <a:rPr lang="en-US" dirty="0" err="1"/>
+              <a:t>hàng</a:t>
+            </a:r>
+            <a:endParaRPr lang="en-US" dirty="0"/>
+          </a:p>
+        </p:txBody>
+      </p:sp>
+      <p:sp>
+        <p:nvSpPr>
+          <p:cNvPr id="3" name="Content Placeholder 2"/>
+          <p:cNvSpPr>
+            <a:spLocks noGrp="1"/>
+          </p:cNvSpPr>
+          <p:nvPr>
+            <p:ph sz="quarter" idx="1"/>
+          </p:nvPr>
+        </p:nvSpPr>
+        <p:spPr/>
+        <p:txBody>
+          <a:bodyPr/>
+          <a:lstStyle/>
+          <a:p>
+            <a:r>
+              <a:rPr lang="en-US" dirty="0"/>
+              <a:t>11.1 </a:t>
+            </a:r>
+            <a:r>
+              <a:rPr lang="en-US" dirty="0" err="1"/>
+              <a:t>Danh</a:t>
+            </a:r>
+            <a:r>
+              <a:rPr lang="en-US" dirty="0"/>
+              <a:t> </a:t>
+            </a:r>
+            <a:r>
+              <a:rPr lang="en-US" dirty="0" err="1"/>
+              <a:t>sách</a:t>
+            </a:r>
+            <a:r>
+              <a:rPr lang="en-US" dirty="0"/>
+              <a:t> </a:t>
+            </a:r>
+            <a:r>
+              <a:rPr lang="en-US" sz="2400" dirty="0" err="1"/>
+              <a:t>nhân</a:t>
+            </a:r>
+            <a:r>
+              <a:rPr lang="en-US" sz="2400" dirty="0"/>
+              <a:t> </a:t>
+            </a:r>
+            <a:r>
+              <a:rPr lang="en-US" sz="2400" dirty="0" err="1"/>
+              <a:t>viên</a:t>
+            </a:r>
+            <a:r>
+              <a:rPr lang="en-US" dirty="0"/>
+              <a:t>:</a:t>
+            </a:r>
+            <a:endParaRPr lang="en-US" dirty="0"/>
+          </a:p>
+        </p:txBody>
+      </p:sp>
+      <p:pic>
+        <p:nvPicPr>
+          <p:cNvPr id="4" name="Picture 3"/>
+          <p:cNvPicPr>
+            <a:picLocks noChangeAspect="1"/>
+          </p:cNvPicPr>
+          <p:nvPr/>
+        </p:nvPicPr>
+        <p:blipFill>
+          <a:blip r:embed="rId2"/>
+          <a:stretch>
+            <a:fillRect/>
+          </a:stretch>
+        </p:blipFill>
+        <p:spPr>
+          <a:xfrm>
+            <a:off x="0" y="1985985"/>
+            <a:ext cx="12192000" cy="2886029"/>
+          </a:xfrm>
+          <a:prstGeom prst="rect">
+            <a:avLst/>
+          </a:prstGeom>
+        </p:spPr>
+      </p:pic>
+    </p:spTree>
+    <p:extLst>
+      <p:ext uri="{BB962C8B-B14F-4D97-AF65-F5344CB8AC3E}">
+        <p14:creationId xmlns:p14="http://schemas.microsoft.com/office/powerpoint/2010/main" val="1512397817"/>
+      </p:ext>
+    </p:extLst>
+  </p:cSld>
+  <p:clrMapOvr>
+    <a:masterClrMapping/>
+  </p:clrMapOvr>
+</p:sld>
+</file>
+
+<file path=ppt/slides/slide24.xml><?xml version="1.0" encoding="utf-8"?>
+<p:sld xmlns:a="http://schemas.openxmlformats.org/drawingml/2006/main" xmlns:r="http://schemas.openxmlformats.org/officeDocument/2006/relationships" xmlns:p="http://schemas.openxmlformats.org/presentationml/2006/main">
+  <p:cSld>
+    <p:spTree>
+      <p:nvGrpSpPr>
+        <p:cNvPr id="1" name=""/>
+        <p:cNvGrpSpPr/>
+        <p:nvPr/>
+      </p:nvGrpSpPr>
+      <p:grpSpPr>
+        <a:xfrm>
+          <a:off x="0" y="0"/>
+          <a:ext cx="0" cy="0"/>
+          <a:chOff x="0" y="0"/>
+          <a:chExt cx="0" cy="0"/>
+        </a:xfrm>
+      </p:grpSpPr>
+      <p:sp>
+        <p:nvSpPr>
+          <p:cNvPr id="2" name="Title 1"/>
+          <p:cNvSpPr>
+            <a:spLocks noGrp="1"/>
+          </p:cNvSpPr>
+          <p:nvPr>
+            <p:ph type="title"/>
+          </p:nvPr>
+        </p:nvSpPr>
+        <p:spPr/>
+        <p:txBody>
+          <a:bodyPr/>
+          <a:lstStyle/>
+          <a:p>
+            <a:r>
+              <a:rPr lang="en-US" dirty="0"/>
+              <a:t>11. </a:t>
+            </a:r>
+            <a:r>
+              <a:rPr lang="en-US" dirty="0" err="1"/>
+              <a:t>Quản</a:t>
+            </a:r>
+            <a:r>
+              <a:rPr lang="en-US" dirty="0"/>
+              <a:t> </a:t>
+            </a:r>
+            <a:r>
+              <a:rPr lang="en-US" dirty="0" err="1"/>
+              <a:t>lí</a:t>
+            </a:r>
+            <a:r>
+              <a:rPr lang="en-US" dirty="0"/>
+              <a:t> ng</a:t>
+            </a:r>
+            <a:r>
+              <a:rPr lang="vi-VN" dirty="0"/>
+              <a:t>ư</a:t>
+            </a:r>
+            <a:r>
+              <a:rPr lang="en-US" dirty="0" err="1"/>
+              <a:t>ời</a:t>
+            </a:r>
+            <a:r>
+              <a:rPr lang="en-US" dirty="0"/>
+              <a:t> </a:t>
+            </a:r>
+            <a:r>
+              <a:rPr lang="en-US" dirty="0" err="1"/>
+              <a:t>bán</a:t>
+            </a:r>
+            <a:r>
+              <a:rPr lang="en-US" dirty="0"/>
+              <a:t> </a:t>
+            </a:r>
+            <a:r>
+              <a:rPr lang="en-US" dirty="0" err="1"/>
+              <a:t>hàng</a:t>
+            </a:r>
+            <a:endParaRPr lang="en-US" dirty="0"/>
+          </a:p>
+        </p:txBody>
+      </p:sp>
+      <p:sp>
+        <p:nvSpPr>
+          <p:cNvPr id="3" name="Content Placeholder 2"/>
+          <p:cNvSpPr>
+            <a:spLocks noGrp="1"/>
+          </p:cNvSpPr>
+          <p:nvPr>
+            <p:ph sz="quarter" idx="1"/>
+          </p:nvPr>
+        </p:nvSpPr>
+        <p:spPr/>
+        <p:txBody>
+          <a:bodyPr/>
+          <a:lstStyle/>
+          <a:p>
+            <a:r>
+              <a:rPr lang="en-US" dirty="0"/>
+              <a:t>11.2 </a:t>
+            </a:r>
+            <a:r>
+              <a:rPr lang="en-US" dirty="0" err="1"/>
+              <a:t>Thêm</a:t>
+            </a:r>
+            <a:r>
+              <a:rPr lang="en-US" dirty="0"/>
+              <a:t> </a:t>
+            </a:r>
+            <a:r>
+              <a:rPr lang="en-US" sz="2400" dirty="0" err="1"/>
+              <a:t>nhân</a:t>
+            </a:r>
+            <a:r>
+              <a:rPr lang="en-US" sz="2400" dirty="0"/>
+              <a:t> </a:t>
+            </a:r>
+            <a:r>
+              <a:rPr lang="en-US" sz="2400" dirty="0" err="1"/>
+              <a:t>viên</a:t>
+            </a:r>
+            <a:r>
+              <a:rPr lang="en-US" dirty="0"/>
+              <a:t>:</a:t>
+            </a:r>
+            <a:endParaRPr lang="en-US" dirty="0"/>
+          </a:p>
+        </p:txBody>
+      </p:sp>
+      <p:pic>
+        <p:nvPicPr>
+          <p:cNvPr id="5" name="Picture 4"/>
+          <p:cNvPicPr>
+            <a:picLocks noChangeAspect="1"/>
+          </p:cNvPicPr>
+          <p:nvPr/>
+        </p:nvPicPr>
+        <p:blipFill>
+          <a:blip r:embed="rId2"/>
+          <a:stretch>
+            <a:fillRect/>
+          </a:stretch>
+        </p:blipFill>
+        <p:spPr>
+          <a:xfrm>
+            <a:off x="0" y="1704987"/>
+            <a:ext cx="12192000" cy="4528173"/>
+          </a:xfrm>
+          <a:prstGeom prst="rect">
+            <a:avLst/>
+          </a:prstGeom>
+        </p:spPr>
+      </p:pic>
+    </p:spTree>
+    <p:extLst>
+      <p:ext uri="{BB962C8B-B14F-4D97-AF65-F5344CB8AC3E}">
+        <p14:creationId xmlns:p14="http://schemas.microsoft.com/office/powerpoint/2010/main" val="3254368352"/>
       </p:ext>
     </p:extLst>
   </p:cSld>
@@ -5463,7 +7892,7 @@
           <p:nvPr>
             <p:extLst>
               <p:ext uri="{D42A27DB-BD31-4B8C-83A1-F6EECF244321}">
-                <p14:modId xmlns:p14="http://schemas.microsoft.com/office/powerpoint/2010/main" val="1437332439"/>
+                <p14:modId xmlns:p14="http://schemas.microsoft.com/office/powerpoint/2010/main" val="2379919868"/>
               </p:ext>
             </p:extLst>
           </p:nvPr>
@@ -5553,9 +7982,18 @@
                     <a:lstStyle/>
                     <a:p>
                       <a:r>
-                        <a:rPr lang="en-US" dirty="0"/>
-                        <a:t>Vũ Tuấn Anh</a:t>
+                        <a:rPr lang="en-US" b="1" dirty="0" err="1"/>
+                        <a:t>Tạ</a:t>
                       </a:r>
+                      <a:r>
+                        <a:rPr lang="en-US" b="1" dirty="0"/>
+                        <a:t> Minh </a:t>
+                      </a:r>
+                      <a:r>
+                        <a:rPr lang="en-US" b="1" dirty="0" err="1"/>
+                        <a:t>Hiển</a:t>
+                      </a:r>
+                      <a:endParaRPr lang="en-US" b="1" dirty="0"/>
                     </a:p>
                   </a:txBody>
                   <a:tcPr/>
@@ -5565,7 +8003,7 @@
                     <a:bodyPr/>
                     <a:lstStyle/>
                     <a:p>
-                      <a:endParaRPr lang="en-US" dirty="0"/>
+                      <a:endParaRPr lang="en-US"/>
                     </a:p>
                   </a:txBody>
                   <a:tcPr/>
@@ -5598,7 +8036,46 @@
                     <a:bodyPr/>
                     <a:lstStyle/>
                     <a:p>
-                      <a:endParaRPr lang="en-US"/>
+                      <a:r>
+                        <a:rPr lang="en-US" dirty="0" err="1"/>
+                        <a:t>Quản</a:t>
+                      </a:r>
+                      <a:r>
+                        <a:rPr lang="en-US" dirty="0"/>
+                        <a:t> </a:t>
+                      </a:r>
+                      <a:r>
+                        <a:rPr lang="en-US" dirty="0" err="1"/>
+                        <a:t>lý</a:t>
+                      </a:r>
+                      <a:r>
+                        <a:rPr lang="en-US" dirty="0"/>
+                        <a:t> </a:t>
+                      </a:r>
+                      <a:r>
+                        <a:rPr lang="en-US" dirty="0" err="1"/>
+                        <a:t>hoá</a:t>
+                      </a:r>
+                      <a:r>
+                        <a:rPr lang="en-US" dirty="0"/>
+                        <a:t> đ</a:t>
+                      </a:r>
+                      <a:r>
+                        <a:rPr lang="vi-VN" dirty="0"/>
+                        <a:t>ơ</a:t>
+                      </a:r>
+                      <a:r>
+                        <a:rPr lang="en-US" dirty="0"/>
+                        <a:t>n </a:t>
+                      </a:r>
+                      <a:r>
+                        <a:rPr lang="en-US" dirty="0" err="1"/>
+                        <a:t>bán</a:t>
+                      </a:r>
+                      <a:r>
+                        <a:rPr lang="en-US" dirty="0"/>
+                        <a:t> hang</a:t>
+                      </a:r>
                     </a:p>
                   </a:txBody>
                   <a:tcPr/>
@@ -5703,27 +8180,6 @@
                     <a:bodyPr/>
                     <a:lstStyle/>
                     <a:p>
-                      <a:pPr marL="0" marR="0" lvl="0" indent="0" algn="l" defTabSz="914400" rtl="0" eaLnBrk="1" fontAlgn="auto" latinLnBrk="0" hangingPunct="1">
-                        <a:lnSpc>
-                          <a:spcPct val="100000"/>
-                        </a:lnSpc>
-                        <a:spcBef>
-                          <a:spcPts val="0"/>
-                        </a:spcBef>
-                        <a:spcAft>
-                          <a:spcPts val="0"/>
-                        </a:spcAft>
-                        <a:buClrTx/>
-                        <a:buSzTx/>
-                        <a:buFontTx/>
-                        <a:buNone/>
-                        <a:tabLst/>
-                        <a:defRPr/>
-                      </a:pPr>
-                      <a:r>
-                        <a:rPr lang="en-US" dirty="0"/>
-                        <a:t>- </a:t>
-                      </a:r>
                       <a:r>
                         <a:rPr lang="en-US" dirty="0" err="1"/>
                         <a:t>Quản</a:t>
@@ -5742,7 +8198,39 @@
                       </a:r>
                       <a:r>
                         <a:rPr lang="en-US" dirty="0" err="1"/>
-                        <a:t>khách</a:t>
+                        <a:t>các</a:t>
+                      </a:r>
+                      <a:r>
+                        <a:rPr lang="en-US" dirty="0"/>
+                        <a:t> </a:t>
+                      </a:r>
+                      <a:r>
+                        <a:rPr lang="en-US" dirty="0" err="1"/>
+                        <a:t>giao</a:t>
+                      </a:r>
+                      <a:r>
+                        <a:rPr lang="en-US" dirty="0"/>
+                        <a:t> </a:t>
+                      </a:r>
+                      <a:r>
+                        <a:rPr lang="en-US" dirty="0" err="1"/>
+                        <a:t>dịch</a:t>
+                      </a:r>
+                      <a:r>
+                        <a:rPr lang="en-US" dirty="0"/>
+                        <a:t> </a:t>
+                      </a:r>
+                      <a:r>
+                        <a:rPr lang="en-US" dirty="0" err="1"/>
+                        <a:t>trả</a:t>
+                      </a:r>
+                      <a:r>
+                        <a:rPr lang="en-US" dirty="0"/>
+                        <a:t> </a:t>
+                      </a:r>
+                      <a:r>
+                        <a:rPr lang="en-US" dirty="0" err="1"/>
+                        <a:t>lại</a:t>
                       </a:r>
                       <a:r>
                         <a:rPr lang="en-US" dirty="0"/>
@@ -5752,9 +8240,6 @@
                         <a:rPr lang="en-US" dirty="0" err="1"/>
                         <a:t>hàng</a:t>
                       </a:r>
-                      <a:endParaRPr lang="en-US" dirty="0"/>
-                    </a:p>
-                    <a:p>
                       <a:endParaRPr lang="en-US" dirty="0"/>
                     </a:p>
                   </a:txBody>
@@ -5860,27 +8345,6 @@
                     <a:bodyPr/>
                     <a:lstStyle/>
                     <a:p>
-                      <a:pPr marL="0" marR="0" lvl="0" indent="0" algn="l" defTabSz="914400" rtl="0" eaLnBrk="1" fontAlgn="auto" latinLnBrk="0" hangingPunct="1">
-                        <a:lnSpc>
-                          <a:spcPct val="100000"/>
-                        </a:lnSpc>
-                        <a:spcBef>
-                          <a:spcPts val="0"/>
-                        </a:spcBef>
-                        <a:spcAft>
-                          <a:spcPts val="0"/>
-                        </a:spcAft>
-                        <a:buClrTx/>
-                        <a:buSzTx/>
-                        <a:buFontTx/>
-                        <a:buNone/>
-                        <a:tabLst/>
-                        <a:defRPr/>
-                      </a:pPr>
-                      <a:r>
-                        <a:rPr lang="en-US" dirty="0"/>
-                        <a:t>- </a:t>
-                      </a:r>
                       <a:r>
                         <a:rPr lang="en-US" dirty="0" err="1"/>
                         <a:t>Quản</a:t>
@@ -5895,15 +8359,51 @@
                       </a:r>
                       <a:r>
                         <a:rPr lang="en-US" dirty="0"/>
-                        <a:t> ng</a:t>
-                      </a:r>
-                      <a:r>
-                        <a:rPr lang="vi-VN" dirty="0"/>
-                        <a:t>ư</a:t>
+                        <a:t> </a:t>
                       </a:r>
                       <a:r>
                         <a:rPr lang="en-US" dirty="0" err="1"/>
-                        <a:t>ời</a:t>
+                        <a:t>phiếu</a:t>
+                      </a:r>
+                      <a:r>
+                        <a:rPr lang="en-US" dirty="0"/>
+                        <a:t> </a:t>
+                      </a:r>
+                      <a:r>
+                        <a:rPr lang="en-US" dirty="0" err="1"/>
+                        <a:t>xuất</a:t>
+                      </a:r>
+                      <a:r>
+                        <a:rPr lang="en-US" dirty="0"/>
+                        <a:t> </a:t>
+                      </a:r>
+                      <a:r>
+                        <a:rPr lang="en-US" dirty="0" err="1"/>
+                        <a:t>kho</a:t>
+                      </a:r>
+                      <a:r>
+                        <a:rPr lang="en-US" dirty="0"/>
+                        <a:t> </a:t>
+                      </a:r>
+                      <a:r>
+                        <a:rPr lang="en-US" dirty="0" err="1"/>
+                        <a:t>cho</a:t>
+                      </a:r>
+                      <a:r>
+                        <a:rPr lang="en-US" dirty="0"/>
+                        <a:t> </a:t>
+                      </a:r>
+                      <a:r>
+                        <a:rPr lang="en-US" dirty="0" err="1"/>
+                        <a:t>nhân</a:t>
+                      </a:r>
+                      <a:r>
+                        <a:rPr lang="en-US" dirty="0"/>
+                        <a:t> </a:t>
+                      </a:r>
+                      <a:r>
+                        <a:rPr lang="en-US" dirty="0" err="1"/>
+                        <a:t>viên</a:t>
                       </a:r>
                       <a:r>
                         <a:rPr lang="en-US" dirty="0"/>
@@ -5921,9 +8421,6 @@
                         <a:rPr lang="en-US" dirty="0" err="1"/>
                         <a:t>hàng</a:t>
                       </a:r>
-                      <a:endParaRPr lang="en-US" dirty="0"/>
-                    </a:p>
-                    <a:p>
                       <a:endParaRPr lang="en-US" dirty="0"/>
                     </a:p>
                   </a:txBody>
@@ -6013,59 +8510,7 @@
                     <a:bodyPr/>
                     <a:lstStyle/>
                     <a:p>
-                      <a:pPr marL="0" marR="0" lvl="0" indent="0" algn="l" defTabSz="914400" rtl="0" eaLnBrk="1" fontAlgn="auto" latinLnBrk="0" hangingPunct="1">
-                        <a:lnSpc>
-                          <a:spcPct val="100000"/>
-                        </a:lnSpc>
-                        <a:spcBef>
-                          <a:spcPts val="0"/>
-                        </a:spcBef>
-                        <a:spcAft>
-                          <a:spcPts val="0"/>
-                        </a:spcAft>
-                        <a:buClrTx/>
-                        <a:buSzTx/>
-                        <a:buFontTx/>
-                        <a:buNone/>
-                        <a:tabLst/>
-                        <a:defRPr/>
-                      </a:pPr>
-                      <a:r>
-                        <a:rPr lang="en-US" dirty="0"/>
-                        <a:t>- </a:t>
-                      </a:r>
-                      <a:r>
-                        <a:rPr lang="en-US" dirty="0" err="1"/>
-                        <a:t>Quản</a:t>
-                      </a:r>
-                      <a:r>
-                        <a:rPr lang="en-US" dirty="0"/>
-                        <a:t> </a:t>
-                      </a:r>
-                      <a:r>
-                        <a:rPr lang="en-US" dirty="0" err="1"/>
-                        <a:t>lý</a:t>
-                      </a:r>
-                      <a:r>
-                        <a:rPr lang="en-US" dirty="0"/>
-                        <a:t> </a:t>
-                      </a:r>
-                      <a:r>
-                        <a:rPr lang="en-US" dirty="0" err="1"/>
-                        <a:t>sản</a:t>
-                      </a:r>
-                      <a:r>
-                        <a:rPr lang="en-US" dirty="0"/>
-                        <a:t> </a:t>
-                      </a:r>
-                      <a:r>
-                        <a:rPr lang="en-US"/>
-                        <a:t>phẩm</a:t>
-                      </a:r>
-                      <a:endParaRPr lang="en-US" dirty="0"/>
-                    </a:p>
-                    <a:p>
-                      <a:endParaRPr lang="en-US" dirty="0"/>
+                      <a:endParaRPr lang="en-US"/>
                     </a:p>
                   </a:txBody>
                   <a:tcPr/>

</xml_diff>